<commit_message>
Added code for automatically replotting training and validation loss on the same axis
</commit_message>
<xml_diff>
--- a/training_results.pptx
+++ b/training_results.pptx
@@ -4,23 +4,27 @@
   <p:sldMasterIdLst>
     <p:sldMasterId id="2147483648" r:id="rId1"/>
   </p:sldMasterIdLst>
+  <p:notesMasterIdLst>
+    <p:notesMasterId r:id="rId19"/>
+  </p:notesMasterIdLst>
   <p:sldIdLst>
-    <p:sldId id="256" r:id="rId7"/>
-    <p:sldId id="257" r:id="rId8"/>
-    <p:sldId id="258" r:id="rId9"/>
-    <p:sldId id="259" r:id="rId10"/>
-    <p:sldId id="260" r:id="rId11"/>
-    <p:sldId id="261" r:id="rId12"/>
-    <p:sldId id="262" r:id="rId13"/>
-    <p:sldId id="263" r:id="rId14"/>
-    <p:sldId id="264" r:id="rId15"/>
-    <p:sldId id="265" r:id="rId16"/>
-    <p:sldId id="266" r:id="rId17"/>
-    <p:sldId id="267" r:id="rId18"/>
-    <p:sldId id="268" r:id="rId19"/>
-    <p:sldId id="269" r:id="rId20"/>
-    <p:sldId id="270" r:id="rId21"/>
-    <p:sldId id="271" r:id="rId22"/>
+    <p:sldId id="256" r:id="rId2"/>
+    <p:sldId id="257" r:id="rId3"/>
+    <p:sldId id="258" r:id="rId4"/>
+    <p:sldId id="259" r:id="rId5"/>
+    <p:sldId id="260" r:id="rId6"/>
+    <p:sldId id="261" r:id="rId7"/>
+    <p:sldId id="262" r:id="rId8"/>
+    <p:sldId id="263" r:id="rId9"/>
+    <p:sldId id="264" r:id="rId10"/>
+    <p:sldId id="265" r:id="rId11"/>
+    <p:sldId id="266" r:id="rId12"/>
+    <p:sldId id="267" r:id="rId13"/>
+    <p:sldId id="268" r:id="rId14"/>
+    <p:sldId id="269" r:id="rId15"/>
+    <p:sldId id="270" r:id="rId16"/>
+    <p:sldId id="271" r:id="rId17"/>
+    <p:sldId id="272" r:id="rId18"/>
   </p:sldIdLst>
   <p:sldSz cx="9144000" cy="6858000" type="screen4x3"/>
   <p:notesSz cx="6858000" cy="9144000"/>
@@ -119,7 +123,540 @@
       </a:defRPr>
     </a:lvl9pPr>
   </p:defaultTextStyle>
+  <p:extLst>
+    <p:ext uri="{EFAFB233-063F-42B5-8137-9DF3F51BA10A}">
+      <p15:sldGuideLst xmlns:p15="http://schemas.microsoft.com/office/powerpoint/2012/main">
+        <p15:guide id="1" orient="horz" pos="2160">
+          <p15:clr>
+            <a:srgbClr val="A4A3A4"/>
+          </p15:clr>
+        </p15:guide>
+        <p15:guide id="2" pos="2880">
+          <p15:clr>
+            <a:srgbClr val="A4A3A4"/>
+          </p15:clr>
+        </p15:guide>
+      </p15:sldGuideLst>
+    </p:ext>
+  </p:extLst>
 </p:presentation>
+</file>
+
+<file path=ppt/notesMasters/notesMaster1.xml><?xml version="1.0" encoding="utf-8"?>
+<p:notesMaster xmlns:a="http://schemas.openxmlformats.org/drawingml/2006/main" xmlns:r="http://schemas.openxmlformats.org/officeDocument/2006/relationships" xmlns:p="http://schemas.openxmlformats.org/presentationml/2006/main">
+  <p:cSld>
+    <p:bg>
+      <p:bgRef idx="1001">
+        <a:schemeClr val="bg1"/>
+      </p:bgRef>
+    </p:bg>
+    <p:spTree>
+      <p:nvGrpSpPr>
+        <p:cNvPr id="1" name=""/>
+        <p:cNvGrpSpPr/>
+        <p:nvPr/>
+      </p:nvGrpSpPr>
+      <p:grpSpPr>
+        <a:xfrm>
+          <a:off x="0" y="0"/>
+          <a:ext cx="0" cy="0"/>
+          <a:chOff x="0" y="0"/>
+          <a:chExt cx="0" cy="0"/>
+        </a:xfrm>
+      </p:grpSpPr>
+      <p:sp>
+        <p:nvSpPr>
+          <p:cNvPr id="2" name="Header Placeholder 1"/>
+          <p:cNvSpPr>
+            <a:spLocks noGrp="1"/>
+          </p:cNvSpPr>
+          <p:nvPr>
+            <p:ph type="hdr" sz="quarter"/>
+          </p:nvPr>
+        </p:nvSpPr>
+        <p:spPr>
+          <a:xfrm>
+            <a:off x="0" y="0"/>
+            <a:ext cx="2971800" cy="458788"/>
+          </a:xfrm>
+          <a:prstGeom prst="rect">
+            <a:avLst/>
+          </a:prstGeom>
+        </p:spPr>
+        <p:txBody>
+          <a:bodyPr vert="horz" lIns="91440" tIns="45720" rIns="91440" bIns="45720" rtlCol="0"/>
+          <a:lstStyle>
+            <a:lvl1pPr algn="l">
+              <a:defRPr sz="1200"/>
+            </a:lvl1pPr>
+          </a:lstStyle>
+          <a:p>
+            <a:endParaRPr lang="en-US"/>
+          </a:p>
+        </p:txBody>
+      </p:sp>
+      <p:sp>
+        <p:nvSpPr>
+          <p:cNvPr id="3" name="Date Placeholder 2"/>
+          <p:cNvSpPr>
+            <a:spLocks noGrp="1"/>
+          </p:cNvSpPr>
+          <p:nvPr>
+            <p:ph type="dt" idx="1"/>
+          </p:nvPr>
+        </p:nvSpPr>
+        <p:spPr>
+          <a:xfrm>
+            <a:off x="3884613" y="0"/>
+            <a:ext cx="2971800" cy="458788"/>
+          </a:xfrm>
+          <a:prstGeom prst="rect">
+            <a:avLst/>
+          </a:prstGeom>
+        </p:spPr>
+        <p:txBody>
+          <a:bodyPr vert="horz" lIns="91440" tIns="45720" rIns="91440" bIns="45720" rtlCol="0"/>
+          <a:lstStyle>
+            <a:lvl1pPr algn="r">
+              <a:defRPr sz="1200"/>
+            </a:lvl1pPr>
+          </a:lstStyle>
+          <a:p>
+            <a:fld id="{9D493089-16CB-F347-ABD8-A4BF5E8575E5}" type="datetimeFigureOut">
+              <a:rPr lang="en-US" smtClean="0"/>
+              <a:t>3/2/25</a:t>
+            </a:fld>
+            <a:endParaRPr lang="en-US"/>
+          </a:p>
+        </p:txBody>
+      </p:sp>
+      <p:sp>
+        <p:nvSpPr>
+          <p:cNvPr id="4" name="Slide Image Placeholder 3"/>
+          <p:cNvSpPr>
+            <a:spLocks noGrp="1" noRot="1" noChangeAspect="1"/>
+          </p:cNvSpPr>
+          <p:nvPr>
+            <p:ph type="sldImg" idx="2"/>
+          </p:nvPr>
+        </p:nvSpPr>
+        <p:spPr>
+          <a:xfrm>
+            <a:off x="1371600" y="1143000"/>
+            <a:ext cx="4114800" cy="3086100"/>
+          </a:xfrm>
+          <a:prstGeom prst="rect">
+            <a:avLst/>
+          </a:prstGeom>
+          <a:noFill/>
+          <a:ln w="12700">
+            <a:solidFill>
+              <a:prstClr val="black"/>
+            </a:solidFill>
+          </a:ln>
+        </p:spPr>
+        <p:txBody>
+          <a:bodyPr vert="horz" lIns="91440" tIns="45720" rIns="91440" bIns="45720" rtlCol="0" anchor="ctr"/>
+          <a:lstStyle/>
+          <a:p>
+            <a:endParaRPr lang="en-US"/>
+          </a:p>
+        </p:txBody>
+      </p:sp>
+      <p:sp>
+        <p:nvSpPr>
+          <p:cNvPr id="5" name="Notes Placeholder 4"/>
+          <p:cNvSpPr>
+            <a:spLocks noGrp="1"/>
+          </p:cNvSpPr>
+          <p:nvPr>
+            <p:ph type="body" sz="quarter" idx="3"/>
+          </p:nvPr>
+        </p:nvSpPr>
+        <p:spPr>
+          <a:xfrm>
+            <a:off x="685800" y="4400550"/>
+            <a:ext cx="5486400" cy="3600450"/>
+          </a:xfrm>
+          <a:prstGeom prst="rect">
+            <a:avLst/>
+          </a:prstGeom>
+        </p:spPr>
+        <p:txBody>
+          <a:bodyPr vert="horz" lIns="91440" tIns="45720" rIns="91440" bIns="45720" rtlCol="0"/>
+          <a:lstStyle/>
+          <a:p>
+            <a:pPr lvl="0"/>
+            <a:r>
+              <a:rPr lang="en-US"/>
+              <a:t>Click to edit Master text styles</a:t>
+            </a:r>
+          </a:p>
+          <a:p>
+            <a:pPr lvl="1"/>
+            <a:r>
+              <a:rPr lang="en-US"/>
+              <a:t>Second level</a:t>
+            </a:r>
+          </a:p>
+          <a:p>
+            <a:pPr lvl="2"/>
+            <a:r>
+              <a:rPr lang="en-US"/>
+              <a:t>Third level</a:t>
+            </a:r>
+          </a:p>
+          <a:p>
+            <a:pPr lvl="3"/>
+            <a:r>
+              <a:rPr lang="en-US"/>
+              <a:t>Fourth level</a:t>
+            </a:r>
+          </a:p>
+          <a:p>
+            <a:pPr lvl="4"/>
+            <a:r>
+              <a:rPr lang="en-US"/>
+              <a:t>Fifth level</a:t>
+            </a:r>
+          </a:p>
+        </p:txBody>
+      </p:sp>
+      <p:sp>
+        <p:nvSpPr>
+          <p:cNvPr id="6" name="Footer Placeholder 5"/>
+          <p:cNvSpPr>
+            <a:spLocks noGrp="1"/>
+          </p:cNvSpPr>
+          <p:nvPr>
+            <p:ph type="ftr" sz="quarter" idx="4"/>
+          </p:nvPr>
+        </p:nvSpPr>
+        <p:spPr>
+          <a:xfrm>
+            <a:off x="0" y="8685213"/>
+            <a:ext cx="2971800" cy="458787"/>
+          </a:xfrm>
+          <a:prstGeom prst="rect">
+            <a:avLst/>
+          </a:prstGeom>
+        </p:spPr>
+        <p:txBody>
+          <a:bodyPr vert="horz" lIns="91440" tIns="45720" rIns="91440" bIns="45720" rtlCol="0" anchor="b"/>
+          <a:lstStyle>
+            <a:lvl1pPr algn="l">
+              <a:defRPr sz="1200"/>
+            </a:lvl1pPr>
+          </a:lstStyle>
+          <a:p>
+            <a:endParaRPr lang="en-US"/>
+          </a:p>
+        </p:txBody>
+      </p:sp>
+      <p:sp>
+        <p:nvSpPr>
+          <p:cNvPr id="7" name="Slide Number Placeholder 6"/>
+          <p:cNvSpPr>
+            <a:spLocks noGrp="1"/>
+          </p:cNvSpPr>
+          <p:nvPr>
+            <p:ph type="sldNum" sz="quarter" idx="5"/>
+          </p:nvPr>
+        </p:nvSpPr>
+        <p:spPr>
+          <a:xfrm>
+            <a:off x="3884613" y="8685213"/>
+            <a:ext cx="2971800" cy="458787"/>
+          </a:xfrm>
+          <a:prstGeom prst="rect">
+            <a:avLst/>
+          </a:prstGeom>
+        </p:spPr>
+        <p:txBody>
+          <a:bodyPr vert="horz" lIns="91440" tIns="45720" rIns="91440" bIns="45720" rtlCol="0" anchor="b"/>
+          <a:lstStyle>
+            <a:lvl1pPr algn="r">
+              <a:defRPr sz="1200"/>
+            </a:lvl1pPr>
+          </a:lstStyle>
+          <a:p>
+            <a:fld id="{ABC40316-198E-3F40-B84E-3A302DEF8462}" type="slidenum">
+              <a:rPr lang="en-US" smtClean="0"/>
+              <a:t>‹#›</a:t>
+            </a:fld>
+            <a:endParaRPr lang="en-US"/>
+          </a:p>
+        </p:txBody>
+      </p:sp>
+    </p:spTree>
+    <p:extLst>
+      <p:ext uri="{BB962C8B-B14F-4D97-AF65-F5344CB8AC3E}">
+        <p14:creationId xmlns:p14="http://schemas.microsoft.com/office/powerpoint/2010/main" val="1851947730"/>
+      </p:ext>
+    </p:extLst>
+  </p:cSld>
+  <p:clrMap bg1="lt1" tx1="dk1" bg2="lt2" tx2="dk2" accent1="accent1" accent2="accent2" accent3="accent3" accent4="accent4" accent5="accent5" accent6="accent6" hlink="hlink" folHlink="folHlink"/>
+  <p:notesStyle>
+    <a:lvl1pPr marL="0" algn="l" defTabSz="914400" rtl="0" eaLnBrk="1" latinLnBrk="0" hangingPunct="1">
+      <a:defRPr sz="1200" kern="1200">
+        <a:solidFill>
+          <a:schemeClr val="tx1"/>
+        </a:solidFill>
+        <a:latin typeface="+mn-lt"/>
+        <a:ea typeface="+mn-ea"/>
+        <a:cs typeface="+mn-cs"/>
+      </a:defRPr>
+    </a:lvl1pPr>
+    <a:lvl2pPr marL="457200" algn="l" defTabSz="914400" rtl="0" eaLnBrk="1" latinLnBrk="0" hangingPunct="1">
+      <a:defRPr sz="1200" kern="1200">
+        <a:solidFill>
+          <a:schemeClr val="tx1"/>
+        </a:solidFill>
+        <a:latin typeface="+mn-lt"/>
+        <a:ea typeface="+mn-ea"/>
+        <a:cs typeface="+mn-cs"/>
+      </a:defRPr>
+    </a:lvl2pPr>
+    <a:lvl3pPr marL="914400" algn="l" defTabSz="914400" rtl="0" eaLnBrk="1" latinLnBrk="0" hangingPunct="1">
+      <a:defRPr sz="1200" kern="1200">
+        <a:solidFill>
+          <a:schemeClr val="tx1"/>
+        </a:solidFill>
+        <a:latin typeface="+mn-lt"/>
+        <a:ea typeface="+mn-ea"/>
+        <a:cs typeface="+mn-cs"/>
+      </a:defRPr>
+    </a:lvl3pPr>
+    <a:lvl4pPr marL="1371600" algn="l" defTabSz="914400" rtl="0" eaLnBrk="1" latinLnBrk="0" hangingPunct="1">
+      <a:defRPr sz="1200" kern="1200">
+        <a:solidFill>
+          <a:schemeClr val="tx1"/>
+        </a:solidFill>
+        <a:latin typeface="+mn-lt"/>
+        <a:ea typeface="+mn-ea"/>
+        <a:cs typeface="+mn-cs"/>
+      </a:defRPr>
+    </a:lvl4pPr>
+    <a:lvl5pPr marL="1828800" algn="l" defTabSz="914400" rtl="0" eaLnBrk="1" latinLnBrk="0" hangingPunct="1">
+      <a:defRPr sz="1200" kern="1200">
+        <a:solidFill>
+          <a:schemeClr val="tx1"/>
+        </a:solidFill>
+        <a:latin typeface="+mn-lt"/>
+        <a:ea typeface="+mn-ea"/>
+        <a:cs typeface="+mn-cs"/>
+      </a:defRPr>
+    </a:lvl5pPr>
+    <a:lvl6pPr marL="2286000" algn="l" defTabSz="914400" rtl="0" eaLnBrk="1" latinLnBrk="0" hangingPunct="1">
+      <a:defRPr sz="1200" kern="1200">
+        <a:solidFill>
+          <a:schemeClr val="tx1"/>
+        </a:solidFill>
+        <a:latin typeface="+mn-lt"/>
+        <a:ea typeface="+mn-ea"/>
+        <a:cs typeface="+mn-cs"/>
+      </a:defRPr>
+    </a:lvl6pPr>
+    <a:lvl7pPr marL="2743200" algn="l" defTabSz="914400" rtl="0" eaLnBrk="1" latinLnBrk="0" hangingPunct="1">
+      <a:defRPr sz="1200" kern="1200">
+        <a:solidFill>
+          <a:schemeClr val="tx1"/>
+        </a:solidFill>
+        <a:latin typeface="+mn-lt"/>
+        <a:ea typeface="+mn-ea"/>
+        <a:cs typeface="+mn-cs"/>
+      </a:defRPr>
+    </a:lvl7pPr>
+    <a:lvl8pPr marL="3200400" algn="l" defTabSz="914400" rtl="0" eaLnBrk="1" latinLnBrk="0" hangingPunct="1">
+      <a:defRPr sz="1200" kern="1200">
+        <a:solidFill>
+          <a:schemeClr val="tx1"/>
+        </a:solidFill>
+        <a:latin typeface="+mn-lt"/>
+        <a:ea typeface="+mn-ea"/>
+        <a:cs typeface="+mn-cs"/>
+      </a:defRPr>
+    </a:lvl8pPr>
+    <a:lvl9pPr marL="3657600" algn="l" defTabSz="914400" rtl="0" eaLnBrk="1" latinLnBrk="0" hangingPunct="1">
+      <a:defRPr sz="1200" kern="1200">
+        <a:solidFill>
+          <a:schemeClr val="tx1"/>
+        </a:solidFill>
+        <a:latin typeface="+mn-lt"/>
+        <a:ea typeface="+mn-ea"/>
+        <a:cs typeface="+mn-cs"/>
+      </a:defRPr>
+    </a:lvl9pPr>
+  </p:notesStyle>
+</p:notesMaster>
+</file>
+
+<file path=ppt/notesSlides/notesSlide1.xml><?xml version="1.0" encoding="utf-8"?>
+<p:notes xmlns:a="http://schemas.openxmlformats.org/drawingml/2006/main" xmlns:r="http://schemas.openxmlformats.org/officeDocument/2006/relationships" xmlns:p="http://schemas.openxmlformats.org/presentationml/2006/main">
+  <p:cSld>
+    <p:spTree>
+      <p:nvGrpSpPr>
+        <p:cNvPr id="1" name=""/>
+        <p:cNvGrpSpPr/>
+        <p:nvPr/>
+      </p:nvGrpSpPr>
+      <p:grpSpPr>
+        <a:xfrm>
+          <a:off x="0" y="0"/>
+          <a:ext cx="0" cy="0"/>
+          <a:chOff x="0" y="0"/>
+          <a:chExt cx="0" cy="0"/>
+        </a:xfrm>
+      </p:grpSpPr>
+      <p:sp>
+        <p:nvSpPr>
+          <p:cNvPr id="2" name="Slide Image Placeholder 1"/>
+          <p:cNvSpPr>
+            <a:spLocks noGrp="1" noRot="1" noChangeAspect="1"/>
+          </p:cNvSpPr>
+          <p:nvPr>
+            <p:ph type="sldImg"/>
+          </p:nvPr>
+        </p:nvSpPr>
+        <p:spPr/>
+      </p:sp>
+      <p:sp>
+        <p:nvSpPr>
+          <p:cNvPr id="3" name="Notes Placeholder 2"/>
+          <p:cNvSpPr>
+            <a:spLocks noGrp="1"/>
+          </p:cNvSpPr>
+          <p:nvPr>
+            <p:ph type="body" idx="1"/>
+          </p:nvPr>
+        </p:nvSpPr>
+        <p:spPr/>
+        <p:txBody>
+          <a:bodyPr/>
+          <a:lstStyle/>
+          <a:p>
+            <a:endParaRPr lang="en-US" dirty="0"/>
+          </a:p>
+        </p:txBody>
+      </p:sp>
+      <p:sp>
+        <p:nvSpPr>
+          <p:cNvPr id="4" name="Slide Number Placeholder 3"/>
+          <p:cNvSpPr>
+            <a:spLocks noGrp="1"/>
+          </p:cNvSpPr>
+          <p:nvPr>
+            <p:ph type="sldNum" sz="quarter" idx="5"/>
+          </p:nvPr>
+        </p:nvSpPr>
+        <p:spPr/>
+        <p:txBody>
+          <a:bodyPr/>
+          <a:lstStyle/>
+          <a:p>
+            <a:fld id="{ABC40316-198E-3F40-B84E-3A302DEF8462}" type="slidenum">
+              <a:rPr lang="en-US" smtClean="0"/>
+              <a:t>14</a:t>
+            </a:fld>
+            <a:endParaRPr lang="en-US"/>
+          </a:p>
+        </p:txBody>
+      </p:sp>
+    </p:spTree>
+    <p:extLst>
+      <p:ext uri="{BB962C8B-B14F-4D97-AF65-F5344CB8AC3E}">
+        <p14:creationId xmlns:p14="http://schemas.microsoft.com/office/powerpoint/2010/main" val="2643170279"/>
+      </p:ext>
+    </p:extLst>
+  </p:cSld>
+  <p:clrMapOvr>
+    <a:masterClrMapping/>
+  </p:clrMapOvr>
+</p:notes>
+</file>
+
+<file path=ppt/notesSlides/notesSlide2.xml><?xml version="1.0" encoding="utf-8"?>
+<p:notes xmlns:a="http://schemas.openxmlformats.org/drawingml/2006/main" xmlns:r="http://schemas.openxmlformats.org/officeDocument/2006/relationships" xmlns:p="http://schemas.openxmlformats.org/presentationml/2006/main">
+  <p:cSld>
+    <p:spTree>
+      <p:nvGrpSpPr>
+        <p:cNvPr id="1" name=""/>
+        <p:cNvGrpSpPr/>
+        <p:nvPr/>
+      </p:nvGrpSpPr>
+      <p:grpSpPr>
+        <a:xfrm>
+          <a:off x="0" y="0"/>
+          <a:ext cx="0" cy="0"/>
+          <a:chOff x="0" y="0"/>
+          <a:chExt cx="0" cy="0"/>
+        </a:xfrm>
+      </p:grpSpPr>
+      <p:sp>
+        <p:nvSpPr>
+          <p:cNvPr id="2" name="Slide Image Placeholder 1"/>
+          <p:cNvSpPr>
+            <a:spLocks noGrp="1" noRot="1" noChangeAspect="1"/>
+          </p:cNvSpPr>
+          <p:nvPr>
+            <p:ph type="sldImg"/>
+          </p:nvPr>
+        </p:nvSpPr>
+        <p:spPr/>
+      </p:sp>
+      <p:sp>
+        <p:nvSpPr>
+          <p:cNvPr id="3" name="Notes Placeholder 2"/>
+          <p:cNvSpPr>
+            <a:spLocks noGrp="1"/>
+          </p:cNvSpPr>
+          <p:nvPr>
+            <p:ph type="body" idx="1"/>
+          </p:nvPr>
+        </p:nvSpPr>
+        <p:spPr/>
+        <p:txBody>
+          <a:bodyPr/>
+          <a:lstStyle/>
+          <a:p>
+            <a:endParaRPr lang="en-US" dirty="0"/>
+          </a:p>
+        </p:txBody>
+      </p:sp>
+      <p:sp>
+        <p:nvSpPr>
+          <p:cNvPr id="4" name="Slide Number Placeholder 3"/>
+          <p:cNvSpPr>
+            <a:spLocks noGrp="1"/>
+          </p:cNvSpPr>
+          <p:nvPr>
+            <p:ph type="sldNum" sz="quarter" idx="5"/>
+          </p:nvPr>
+        </p:nvSpPr>
+        <p:spPr/>
+        <p:txBody>
+          <a:bodyPr/>
+          <a:lstStyle/>
+          <a:p>
+            <a:fld id="{ABC40316-198E-3F40-B84E-3A302DEF8462}" type="slidenum">
+              <a:rPr lang="en-US" smtClean="0"/>
+              <a:t>17</a:t>
+            </a:fld>
+            <a:endParaRPr lang="en-US"/>
+          </a:p>
+        </p:txBody>
+      </p:sp>
+    </p:spTree>
+    <p:extLst>
+      <p:ext uri="{BB962C8B-B14F-4D97-AF65-F5344CB8AC3E}">
+        <p14:creationId xmlns:p14="http://schemas.microsoft.com/office/powerpoint/2010/main" val="222989282"/>
+      </p:ext>
+    </p:extLst>
+  </p:cSld>
+  <p:clrMapOvr>
+    <a:masterClrMapping/>
+  </p:clrMapOvr>
+</p:notes>
 </file>
 
 <file path=ppt/slideLayouts/slideLayout1.xml><?xml version="1.0" encoding="utf-8"?>
@@ -160,10 +697,9 @@
           <a:lstStyle/>
           <a:p>
             <a:r>
-              <a:rPr lang="en-US" smtClean="0"/>
+              <a:rPr lang="en-US"/>
               <a:t>Click to edit Master title style</a:t>
             </a:r>
-            <a:endParaRPr lang="en-US"/>
           </a:p>
         </p:txBody>
       </p:sp>
@@ -279,10 +815,9 @@
           </a:lstStyle>
           <a:p>
             <a:r>
-              <a:rPr lang="en-US" smtClean="0"/>
+              <a:rPr lang="en-US"/>
               <a:t>Click to edit Master subtitle style</a:t>
             </a:r>
-            <a:endParaRPr lang="en-US"/>
           </a:p>
         </p:txBody>
       </p:sp>
@@ -303,7 +838,7 @@
           <a:p>
             <a:fld id="{5BCAD085-E8A6-8845-BD4E-CB4CCA059FC4}" type="datetimeFigureOut">
               <a:rPr lang="en-US" smtClean="0"/>
-              <a:t>1/27/13</a:t>
+              <a:t>3/2/25</a:t>
             </a:fld>
             <a:endParaRPr lang="en-US"/>
           </a:p>
@@ -397,10 +932,9 @@
           <a:lstStyle/>
           <a:p>
             <a:r>
-              <a:rPr lang="en-US" smtClean="0"/>
+              <a:rPr lang="en-US"/>
               <a:t>Click to edit Master title style</a:t>
             </a:r>
-            <a:endParaRPr lang="en-US"/>
           </a:p>
         </p:txBody>
       </p:sp>
@@ -421,38 +955,37 @@
           <a:p>
             <a:pPr lvl="0"/>
             <a:r>
-              <a:rPr lang="en-US" smtClean="0"/>
+              <a:rPr lang="en-US"/>
               <a:t>Click to edit Master text styles</a:t>
             </a:r>
           </a:p>
           <a:p>
             <a:pPr lvl="1"/>
             <a:r>
-              <a:rPr lang="en-US" smtClean="0"/>
+              <a:rPr lang="en-US"/>
               <a:t>Second level</a:t>
             </a:r>
           </a:p>
           <a:p>
             <a:pPr lvl="2"/>
             <a:r>
-              <a:rPr lang="en-US" smtClean="0"/>
+              <a:rPr lang="en-US"/>
               <a:t>Third level</a:t>
             </a:r>
           </a:p>
           <a:p>
             <a:pPr lvl="3"/>
             <a:r>
-              <a:rPr lang="en-US" smtClean="0"/>
+              <a:rPr lang="en-US"/>
               <a:t>Fourth level</a:t>
             </a:r>
           </a:p>
           <a:p>
             <a:pPr lvl="4"/>
             <a:r>
-              <a:rPr lang="en-US" smtClean="0"/>
+              <a:rPr lang="en-US"/>
               <a:t>Fifth level</a:t>
             </a:r>
-            <a:endParaRPr lang="en-US"/>
           </a:p>
         </p:txBody>
       </p:sp>
@@ -473,7 +1006,7 @@
           <a:p>
             <a:fld id="{5BCAD085-E8A6-8845-BD4E-CB4CCA059FC4}" type="datetimeFigureOut">
               <a:rPr lang="en-US" smtClean="0"/>
-              <a:t>1/27/13</a:t>
+              <a:t>3/2/25</a:t>
             </a:fld>
             <a:endParaRPr lang="en-US"/>
           </a:p>
@@ -572,10 +1105,9 @@
           <a:lstStyle/>
           <a:p>
             <a:r>
-              <a:rPr lang="en-US" smtClean="0"/>
+              <a:rPr lang="en-US"/>
               <a:t>Click to edit Master title style</a:t>
             </a:r>
-            <a:endParaRPr lang="en-US"/>
           </a:p>
         </p:txBody>
       </p:sp>
@@ -601,38 +1133,37 @@
           <a:p>
             <a:pPr lvl="0"/>
             <a:r>
-              <a:rPr lang="en-US" smtClean="0"/>
+              <a:rPr lang="en-US"/>
               <a:t>Click to edit Master text styles</a:t>
             </a:r>
           </a:p>
           <a:p>
             <a:pPr lvl="1"/>
             <a:r>
-              <a:rPr lang="en-US" smtClean="0"/>
+              <a:rPr lang="en-US"/>
               <a:t>Second level</a:t>
             </a:r>
           </a:p>
           <a:p>
             <a:pPr lvl="2"/>
             <a:r>
-              <a:rPr lang="en-US" smtClean="0"/>
+              <a:rPr lang="en-US"/>
               <a:t>Third level</a:t>
             </a:r>
           </a:p>
           <a:p>
             <a:pPr lvl="3"/>
             <a:r>
-              <a:rPr lang="en-US" smtClean="0"/>
+              <a:rPr lang="en-US"/>
               <a:t>Fourth level</a:t>
             </a:r>
           </a:p>
           <a:p>
             <a:pPr lvl="4"/>
             <a:r>
-              <a:rPr lang="en-US" smtClean="0"/>
+              <a:rPr lang="en-US"/>
               <a:t>Fifth level</a:t>
             </a:r>
-            <a:endParaRPr lang="en-US"/>
           </a:p>
         </p:txBody>
       </p:sp>
@@ -653,7 +1184,7 @@
           <a:p>
             <a:fld id="{5BCAD085-E8A6-8845-BD4E-CB4CCA059FC4}" type="datetimeFigureOut">
               <a:rPr lang="en-US" smtClean="0"/>
-              <a:t>1/27/13</a:t>
+              <a:t>3/2/25</a:t>
             </a:fld>
             <a:endParaRPr lang="en-US"/>
           </a:p>
@@ -747,10 +1278,9 @@
           <a:lstStyle/>
           <a:p>
             <a:r>
-              <a:rPr lang="en-US" smtClean="0"/>
+              <a:rPr lang="en-US"/>
               <a:t>Click to edit Master title style</a:t>
             </a:r>
-            <a:endParaRPr lang="en-US"/>
           </a:p>
         </p:txBody>
       </p:sp>
@@ -771,38 +1301,37 @@
           <a:p>
             <a:pPr lvl="0"/>
             <a:r>
-              <a:rPr lang="en-US" smtClean="0"/>
+              <a:rPr lang="en-US"/>
               <a:t>Click to edit Master text styles</a:t>
             </a:r>
           </a:p>
           <a:p>
             <a:pPr lvl="1"/>
             <a:r>
-              <a:rPr lang="en-US" smtClean="0"/>
+              <a:rPr lang="en-US"/>
               <a:t>Second level</a:t>
             </a:r>
           </a:p>
           <a:p>
             <a:pPr lvl="2"/>
             <a:r>
-              <a:rPr lang="en-US" smtClean="0"/>
+              <a:rPr lang="en-US"/>
               <a:t>Third level</a:t>
             </a:r>
           </a:p>
           <a:p>
             <a:pPr lvl="3"/>
             <a:r>
-              <a:rPr lang="en-US" smtClean="0"/>
+              <a:rPr lang="en-US"/>
               <a:t>Fourth level</a:t>
             </a:r>
           </a:p>
           <a:p>
             <a:pPr lvl="4"/>
             <a:r>
-              <a:rPr lang="en-US" smtClean="0"/>
+              <a:rPr lang="en-US"/>
               <a:t>Fifth level</a:t>
             </a:r>
-            <a:endParaRPr lang="en-US"/>
           </a:p>
         </p:txBody>
       </p:sp>
@@ -823,7 +1352,7 @@
           <a:p>
             <a:fld id="{5BCAD085-E8A6-8845-BD4E-CB4CCA059FC4}" type="datetimeFigureOut">
               <a:rPr lang="en-US" smtClean="0"/>
-              <a:t>1/27/13</a:t>
+              <a:t>3/2/25</a:t>
             </a:fld>
             <a:endParaRPr lang="en-US"/>
           </a:p>
@@ -926,10 +1455,9 @@
           </a:lstStyle>
           <a:p>
             <a:r>
-              <a:rPr lang="en-US" smtClean="0"/>
+              <a:rPr lang="en-US"/>
               <a:t>Click to edit Master title style</a:t>
             </a:r>
-            <a:endParaRPr lang="en-US"/>
           </a:p>
         </p:txBody>
       </p:sp>
@@ -1046,7 +1574,7 @@
           <a:p>
             <a:pPr lvl="0"/>
             <a:r>
-              <a:rPr lang="en-US" smtClean="0"/>
+              <a:rPr lang="en-US"/>
               <a:t>Click to edit Master text styles</a:t>
             </a:r>
           </a:p>
@@ -1069,7 +1597,7 @@
           <a:p>
             <a:fld id="{5BCAD085-E8A6-8845-BD4E-CB4CCA059FC4}" type="datetimeFigureOut">
               <a:rPr lang="en-US" smtClean="0"/>
-              <a:t>1/27/13</a:t>
+              <a:t>3/2/25</a:t>
             </a:fld>
             <a:endParaRPr lang="en-US"/>
           </a:p>
@@ -1163,10 +1691,9 @@
           <a:lstStyle/>
           <a:p>
             <a:r>
-              <a:rPr lang="en-US" smtClean="0"/>
+              <a:rPr lang="en-US"/>
               <a:t>Click to edit Master title style</a:t>
             </a:r>
-            <a:endParaRPr lang="en-US"/>
           </a:p>
         </p:txBody>
       </p:sp>
@@ -1220,38 +1747,37 @@
           <a:p>
             <a:pPr lvl="0"/>
             <a:r>
-              <a:rPr lang="en-US" smtClean="0"/>
+              <a:rPr lang="en-US"/>
               <a:t>Click to edit Master text styles</a:t>
             </a:r>
           </a:p>
           <a:p>
             <a:pPr lvl="1"/>
             <a:r>
-              <a:rPr lang="en-US" smtClean="0"/>
+              <a:rPr lang="en-US"/>
               <a:t>Second level</a:t>
             </a:r>
           </a:p>
           <a:p>
             <a:pPr lvl="2"/>
             <a:r>
-              <a:rPr lang="en-US" smtClean="0"/>
+              <a:rPr lang="en-US"/>
               <a:t>Third level</a:t>
             </a:r>
           </a:p>
           <a:p>
             <a:pPr lvl="3"/>
             <a:r>
-              <a:rPr lang="en-US" smtClean="0"/>
+              <a:rPr lang="en-US"/>
               <a:t>Fourth level</a:t>
             </a:r>
           </a:p>
           <a:p>
             <a:pPr lvl="4"/>
             <a:r>
-              <a:rPr lang="en-US" smtClean="0"/>
+              <a:rPr lang="en-US"/>
               <a:t>Fifth level</a:t>
             </a:r>
-            <a:endParaRPr lang="en-US"/>
           </a:p>
         </p:txBody>
       </p:sp>
@@ -1305,38 +1831,37 @@
           <a:p>
             <a:pPr lvl="0"/>
             <a:r>
-              <a:rPr lang="en-US" smtClean="0"/>
+              <a:rPr lang="en-US"/>
               <a:t>Click to edit Master text styles</a:t>
             </a:r>
           </a:p>
           <a:p>
             <a:pPr lvl="1"/>
             <a:r>
-              <a:rPr lang="en-US" smtClean="0"/>
+              <a:rPr lang="en-US"/>
               <a:t>Second level</a:t>
             </a:r>
           </a:p>
           <a:p>
             <a:pPr lvl="2"/>
             <a:r>
-              <a:rPr lang="en-US" smtClean="0"/>
+              <a:rPr lang="en-US"/>
               <a:t>Third level</a:t>
             </a:r>
           </a:p>
           <a:p>
             <a:pPr lvl="3"/>
             <a:r>
-              <a:rPr lang="en-US" smtClean="0"/>
+              <a:rPr lang="en-US"/>
               <a:t>Fourth level</a:t>
             </a:r>
           </a:p>
           <a:p>
             <a:pPr lvl="4"/>
             <a:r>
-              <a:rPr lang="en-US" smtClean="0"/>
+              <a:rPr lang="en-US"/>
               <a:t>Fifth level</a:t>
             </a:r>
-            <a:endParaRPr lang="en-US"/>
           </a:p>
         </p:txBody>
       </p:sp>
@@ -1357,7 +1882,7 @@
           <a:p>
             <a:fld id="{5BCAD085-E8A6-8845-BD4E-CB4CCA059FC4}" type="datetimeFigureOut">
               <a:rPr lang="en-US" smtClean="0"/>
-              <a:t>1/27/13</a:t>
+              <a:t>3/2/25</a:t>
             </a:fld>
             <a:endParaRPr lang="en-US"/>
           </a:p>
@@ -1455,10 +1980,9 @@
           </a:lstStyle>
           <a:p>
             <a:r>
-              <a:rPr lang="en-US" smtClean="0"/>
+              <a:rPr lang="en-US"/>
               <a:t>Click to edit Master title style</a:t>
             </a:r>
-            <a:endParaRPr lang="en-US"/>
           </a:p>
         </p:txBody>
       </p:sp>
@@ -1521,7 +2045,7 @@
           <a:p>
             <a:pPr lvl="0"/>
             <a:r>
-              <a:rPr lang="en-US" smtClean="0"/>
+              <a:rPr lang="en-US"/>
               <a:t>Click to edit Master text styles</a:t>
             </a:r>
           </a:p>
@@ -1577,38 +2101,37 @@
           <a:p>
             <a:pPr lvl="0"/>
             <a:r>
-              <a:rPr lang="en-US" smtClean="0"/>
+              <a:rPr lang="en-US"/>
               <a:t>Click to edit Master text styles</a:t>
             </a:r>
           </a:p>
           <a:p>
             <a:pPr lvl="1"/>
             <a:r>
-              <a:rPr lang="en-US" smtClean="0"/>
+              <a:rPr lang="en-US"/>
               <a:t>Second level</a:t>
             </a:r>
           </a:p>
           <a:p>
             <a:pPr lvl="2"/>
             <a:r>
-              <a:rPr lang="en-US" smtClean="0"/>
+              <a:rPr lang="en-US"/>
               <a:t>Third level</a:t>
             </a:r>
           </a:p>
           <a:p>
             <a:pPr lvl="3"/>
             <a:r>
-              <a:rPr lang="en-US" smtClean="0"/>
+              <a:rPr lang="en-US"/>
               <a:t>Fourth level</a:t>
             </a:r>
           </a:p>
           <a:p>
             <a:pPr lvl="4"/>
             <a:r>
-              <a:rPr lang="en-US" smtClean="0"/>
+              <a:rPr lang="en-US"/>
               <a:t>Fifth level</a:t>
             </a:r>
-            <a:endParaRPr lang="en-US"/>
           </a:p>
         </p:txBody>
       </p:sp>
@@ -1671,7 +2194,7 @@
           <a:p>
             <a:pPr lvl="0"/>
             <a:r>
-              <a:rPr lang="en-US" smtClean="0"/>
+              <a:rPr lang="en-US"/>
               <a:t>Click to edit Master text styles</a:t>
             </a:r>
           </a:p>
@@ -1727,38 +2250,37 @@
           <a:p>
             <a:pPr lvl="0"/>
             <a:r>
-              <a:rPr lang="en-US" smtClean="0"/>
+              <a:rPr lang="en-US"/>
               <a:t>Click to edit Master text styles</a:t>
             </a:r>
           </a:p>
           <a:p>
             <a:pPr lvl="1"/>
             <a:r>
-              <a:rPr lang="en-US" smtClean="0"/>
+              <a:rPr lang="en-US"/>
               <a:t>Second level</a:t>
             </a:r>
           </a:p>
           <a:p>
             <a:pPr lvl="2"/>
             <a:r>
-              <a:rPr lang="en-US" smtClean="0"/>
+              <a:rPr lang="en-US"/>
               <a:t>Third level</a:t>
             </a:r>
           </a:p>
           <a:p>
             <a:pPr lvl="3"/>
             <a:r>
-              <a:rPr lang="en-US" smtClean="0"/>
+              <a:rPr lang="en-US"/>
               <a:t>Fourth level</a:t>
             </a:r>
           </a:p>
           <a:p>
             <a:pPr lvl="4"/>
             <a:r>
-              <a:rPr lang="en-US" smtClean="0"/>
+              <a:rPr lang="en-US"/>
               <a:t>Fifth level</a:t>
             </a:r>
-            <a:endParaRPr lang="en-US"/>
           </a:p>
         </p:txBody>
       </p:sp>
@@ -1779,7 +2301,7 @@
           <a:p>
             <a:fld id="{5BCAD085-E8A6-8845-BD4E-CB4CCA059FC4}" type="datetimeFigureOut">
               <a:rPr lang="en-US" smtClean="0"/>
-              <a:t>1/27/13</a:t>
+              <a:t>3/2/25</a:t>
             </a:fld>
             <a:endParaRPr lang="en-US"/>
           </a:p>
@@ -1873,10 +2395,9 @@
           <a:lstStyle/>
           <a:p>
             <a:r>
-              <a:rPr lang="en-US" smtClean="0"/>
+              <a:rPr lang="en-US"/>
               <a:t>Click to edit Master title style</a:t>
             </a:r>
-            <a:endParaRPr lang="en-US"/>
           </a:p>
         </p:txBody>
       </p:sp>
@@ -1897,7 +2418,7 @@
           <a:p>
             <a:fld id="{5BCAD085-E8A6-8845-BD4E-CB4CCA059FC4}" type="datetimeFigureOut">
               <a:rPr lang="en-US" smtClean="0"/>
-              <a:t>1/27/13</a:t>
+              <a:t>3/2/25</a:t>
             </a:fld>
             <a:endParaRPr lang="en-US"/>
           </a:p>
@@ -1992,7 +2513,7 @@
           <a:p>
             <a:fld id="{5BCAD085-E8A6-8845-BD4E-CB4CCA059FC4}" type="datetimeFigureOut">
               <a:rPr lang="en-US" smtClean="0"/>
-              <a:t>1/27/13</a:t>
+              <a:t>3/2/25</a:t>
             </a:fld>
             <a:endParaRPr lang="en-US"/>
           </a:p>
@@ -2095,10 +2616,9 @@
           </a:lstStyle>
           <a:p>
             <a:r>
-              <a:rPr lang="en-US" smtClean="0"/>
+              <a:rPr lang="en-US"/>
               <a:t>Click to edit Master title style</a:t>
             </a:r>
-            <a:endParaRPr lang="en-US"/>
           </a:p>
         </p:txBody>
       </p:sp>
@@ -2152,38 +2672,37 @@
           <a:p>
             <a:pPr lvl="0"/>
             <a:r>
-              <a:rPr lang="en-US" smtClean="0"/>
+              <a:rPr lang="en-US"/>
               <a:t>Click to edit Master text styles</a:t>
             </a:r>
           </a:p>
           <a:p>
             <a:pPr lvl="1"/>
             <a:r>
-              <a:rPr lang="en-US" smtClean="0"/>
+              <a:rPr lang="en-US"/>
               <a:t>Second level</a:t>
             </a:r>
           </a:p>
           <a:p>
             <a:pPr lvl="2"/>
             <a:r>
-              <a:rPr lang="en-US" smtClean="0"/>
+              <a:rPr lang="en-US"/>
               <a:t>Third level</a:t>
             </a:r>
           </a:p>
           <a:p>
             <a:pPr lvl="3"/>
             <a:r>
-              <a:rPr lang="en-US" smtClean="0"/>
+              <a:rPr lang="en-US"/>
               <a:t>Fourth level</a:t>
             </a:r>
           </a:p>
           <a:p>
             <a:pPr lvl="4"/>
             <a:r>
-              <a:rPr lang="en-US" smtClean="0"/>
+              <a:rPr lang="en-US"/>
               <a:t>Fifth level</a:t>
             </a:r>
-            <a:endParaRPr lang="en-US"/>
           </a:p>
         </p:txBody>
       </p:sp>
@@ -2246,7 +2765,7 @@
           <a:p>
             <a:pPr lvl="0"/>
             <a:r>
-              <a:rPr lang="en-US" smtClean="0"/>
+              <a:rPr lang="en-US"/>
               <a:t>Click to edit Master text styles</a:t>
             </a:r>
           </a:p>
@@ -2269,7 +2788,7 @@
           <a:p>
             <a:fld id="{5BCAD085-E8A6-8845-BD4E-CB4CCA059FC4}" type="datetimeFigureOut">
               <a:rPr lang="en-US" smtClean="0"/>
-              <a:t>1/27/13</a:t>
+              <a:t>3/2/25</a:t>
             </a:fld>
             <a:endParaRPr lang="en-US"/>
           </a:p>
@@ -2372,10 +2891,9 @@
           </a:lstStyle>
           <a:p>
             <a:r>
-              <a:rPr lang="en-US" smtClean="0"/>
+              <a:rPr lang="en-US"/>
               <a:t>Click to edit Master title style</a:t>
             </a:r>
-            <a:endParaRPr lang="en-US"/>
           </a:p>
         </p:txBody>
       </p:sp>
@@ -2499,7 +3017,7 @@
           <a:p>
             <a:pPr lvl="0"/>
             <a:r>
-              <a:rPr lang="en-US" smtClean="0"/>
+              <a:rPr lang="en-US"/>
               <a:t>Click to edit Master text styles</a:t>
             </a:r>
           </a:p>
@@ -2522,7 +3040,7 @@
           <a:p>
             <a:fld id="{5BCAD085-E8A6-8845-BD4E-CB4CCA059FC4}" type="datetimeFigureOut">
               <a:rPr lang="en-US" smtClean="0"/>
-              <a:t>1/27/13</a:t>
+              <a:t>3/2/25</a:t>
             </a:fld>
             <a:endParaRPr lang="en-US"/>
           </a:p>
@@ -2631,10 +3149,9 @@
           <a:lstStyle/>
           <a:p>
             <a:r>
-              <a:rPr lang="en-US" smtClean="0"/>
+              <a:rPr lang="en-US"/>
               <a:t>Click to edit Master title style</a:t>
             </a:r>
-            <a:endParaRPr lang="en-US"/>
           </a:p>
         </p:txBody>
       </p:sp>
@@ -2665,38 +3182,37 @@
           <a:p>
             <a:pPr lvl="0"/>
             <a:r>
-              <a:rPr lang="en-US" smtClean="0"/>
+              <a:rPr lang="en-US"/>
               <a:t>Click to edit Master text styles</a:t>
             </a:r>
           </a:p>
           <a:p>
             <a:pPr lvl="1"/>
             <a:r>
-              <a:rPr lang="en-US" smtClean="0"/>
+              <a:rPr lang="en-US"/>
               <a:t>Second level</a:t>
             </a:r>
           </a:p>
           <a:p>
             <a:pPr lvl="2"/>
             <a:r>
-              <a:rPr lang="en-US" smtClean="0"/>
+              <a:rPr lang="en-US"/>
               <a:t>Third level</a:t>
             </a:r>
           </a:p>
           <a:p>
             <a:pPr lvl="3"/>
             <a:r>
-              <a:rPr lang="en-US" smtClean="0"/>
+              <a:rPr lang="en-US"/>
               <a:t>Fourth level</a:t>
             </a:r>
           </a:p>
           <a:p>
             <a:pPr lvl="4"/>
             <a:r>
-              <a:rPr lang="en-US" smtClean="0"/>
+              <a:rPr lang="en-US"/>
               <a:t>Fifth level</a:t>
             </a:r>
-            <a:endParaRPr lang="en-US"/>
           </a:p>
         </p:txBody>
       </p:sp>
@@ -2735,7 +3251,7 @@
           <a:p>
             <a:fld id="{5BCAD085-E8A6-8845-BD4E-CB4CCA059FC4}" type="datetimeFigureOut">
               <a:rPr lang="en-US" smtClean="0"/>
-              <a:t>1/27/13</a:t>
+              <a:t>3/2/25</a:t>
             </a:fld>
             <a:endParaRPr lang="en-US"/>
           </a:p>
@@ -3094,7 +3610,7 @@
 </file>
 
 <file path=ppt/slides/slide1.xml><?xml version="1.0" encoding="utf-8"?>
-<p:sld xmlns:a="http://schemas.openxmlformats.org/drawingml/2006/main" xmlns:p="http://schemas.openxmlformats.org/presentationml/2006/main" xmlns:r="http://schemas.openxmlformats.org/officeDocument/2006/relationships">
+<p:sld xmlns:a="http://schemas.openxmlformats.org/drawingml/2006/main" xmlns:r="http://schemas.openxmlformats.org/officeDocument/2006/relationships" xmlns:p="http://schemas.openxmlformats.org/presentationml/2006/main">
   <p:cSld>
     <p:spTree>
       <p:nvGrpSpPr>
@@ -3102,31 +3618,17 @@
         <p:cNvGrpSpPr/>
         <p:nvPr/>
       </p:nvGrpSpPr>
-      <p:grpSpPr/>
-      <p:sp>
-        <p:nvSpPr>
-          <p:cNvPr id="2" name="Title 1"/>
-          <p:cNvSpPr>
-            <a:spLocks noGrp="1"/>
-          </p:cNvSpPr>
-          <p:nvPr>
-            <p:ph type="title"/>
-          </p:nvPr>
-        </p:nvSpPr>
-        <p:spPr/>
-        <p:txBody>
-          <a:bodyPr/>
-          <a:lstStyle/>
-          <a:p>
-            <a:r>
-              <a:t>truncated_b0_leaky_reduced_layers_4_2025-03-02_05-10</a:t>
-            </a:r>
-          </a:p>
-        </p:txBody>
-      </p:sp>
+      <p:grpSpPr>
+        <a:xfrm>
+          <a:off x="0" y="0"/>
+          <a:ext cx="0" cy="0"/>
+          <a:chOff x="0" y="0"/>
+          <a:chExt cx="0" cy="0"/>
+        </a:xfrm>
+      </p:grpSpPr>
       <p:pic>
         <p:nvPicPr>
-          <p:cNvPr id="3" name="Picture 2" descr="truncated_b0_leaky_reduced_layers_4_2025-03-02_05-10.png"/>
+          <p:cNvPr id="2" name="Picture 1" descr="truncated_b0_leaky2_reduced_layers_0_2025-03-02_06-05.png"/>
           <p:cNvPicPr>
             <a:picLocks noChangeAspect="1"/>
           </p:cNvPicPr>
@@ -3141,7 +3643,7 @@
         <p:spPr>
           <a:xfrm>
             <a:off x="914400" y="1371600"/>
-            <a:ext cx="5486400" cy="4114800"/>
+            <a:ext cx="7315200" cy="5486400"/>
           </a:xfrm>
           <a:prstGeom prst="rect">
             <a:avLst/>
@@ -3157,7 +3659,7 @@
 </file>
 
 <file path=ppt/slides/slide10.xml><?xml version="1.0" encoding="utf-8"?>
-<p:sld xmlns:a="http://schemas.openxmlformats.org/drawingml/2006/main" xmlns:p="http://schemas.openxmlformats.org/presentationml/2006/main" xmlns:r="http://schemas.openxmlformats.org/officeDocument/2006/relationships">
+<p:sld xmlns:a="http://schemas.openxmlformats.org/drawingml/2006/main" xmlns:r="http://schemas.openxmlformats.org/officeDocument/2006/relationships" xmlns:p="http://schemas.openxmlformats.org/presentationml/2006/main">
   <p:cSld>
     <p:spTree>
       <p:nvGrpSpPr>
@@ -3165,31 +3667,17 @@
         <p:cNvGrpSpPr/>
         <p:nvPr/>
       </p:nvGrpSpPr>
-      <p:grpSpPr/>
-      <p:sp>
-        <p:nvSpPr>
-          <p:cNvPr id="2" name="Title 1"/>
-          <p:cNvSpPr>
-            <a:spLocks noGrp="1"/>
-          </p:cNvSpPr>
-          <p:nvPr>
-            <p:ph type="title"/>
-          </p:nvPr>
-        </p:nvSpPr>
-        <p:spPr/>
-        <p:txBody>
-          <a:bodyPr/>
-          <a:lstStyle/>
-          <a:p>
-            <a:r>
-              <a:t>truncated_b0_leaky2_reduced_layers_2_2025-03-02_08-31</a:t>
-            </a:r>
-          </a:p>
-        </p:txBody>
-      </p:sp>
+      <p:grpSpPr>
+        <a:xfrm>
+          <a:off x="0" y="0"/>
+          <a:ext cx="0" cy="0"/>
+          <a:chOff x="0" y="0"/>
+          <a:chExt cx="0" cy="0"/>
+        </a:xfrm>
+      </p:grpSpPr>
       <p:pic>
         <p:nvPicPr>
-          <p:cNvPr id="3" name="Picture 2" descr="truncated_b0_leaky2_reduced_layers_2_2025-03-02_08-31.png"/>
+          <p:cNvPr id="2" name="Picture 1" descr="truncated_b0_leaky_reduced_layers_4_2025-03-02_05-10.png"/>
           <p:cNvPicPr>
             <a:picLocks noChangeAspect="1"/>
           </p:cNvPicPr>
@@ -3204,7 +3692,7 @@
         <p:spPr>
           <a:xfrm>
             <a:off x="914400" y="1371600"/>
-            <a:ext cx="5486400" cy="4114800"/>
+            <a:ext cx="7315200" cy="5486400"/>
           </a:xfrm>
           <a:prstGeom prst="rect">
             <a:avLst/>
@@ -3220,7 +3708,7 @@
 </file>
 
 <file path=ppt/slides/slide11.xml><?xml version="1.0" encoding="utf-8"?>
-<p:sld xmlns:a="http://schemas.openxmlformats.org/drawingml/2006/main" xmlns:p="http://schemas.openxmlformats.org/presentationml/2006/main" xmlns:r="http://schemas.openxmlformats.org/officeDocument/2006/relationships">
+<p:sld xmlns:a="http://schemas.openxmlformats.org/drawingml/2006/main" xmlns:r="http://schemas.openxmlformats.org/officeDocument/2006/relationships" xmlns:p="http://schemas.openxmlformats.org/presentationml/2006/main">
   <p:cSld>
     <p:spTree>
       <p:nvGrpSpPr>
@@ -3228,31 +3716,17 @@
         <p:cNvGrpSpPr/>
         <p:nvPr/>
       </p:nvGrpSpPr>
-      <p:grpSpPr/>
-      <p:sp>
-        <p:nvSpPr>
-          <p:cNvPr id="2" name="Title 1"/>
-          <p:cNvSpPr>
-            <a:spLocks noGrp="1"/>
-          </p:cNvSpPr>
-          <p:nvPr>
-            <p:ph type="title"/>
-          </p:nvPr>
-        </p:nvSpPr>
-        <p:spPr/>
-        <p:txBody>
-          <a:bodyPr/>
-          <a:lstStyle/>
-          <a:p>
-            <a:r>
-              <a:t>truncated_b0_leaky2_reduced_layers_3_2025-03-02_09-34</a:t>
-            </a:r>
-          </a:p>
-        </p:txBody>
-      </p:sp>
+      <p:grpSpPr>
+        <a:xfrm>
+          <a:off x="0" y="0"/>
+          <a:ext cx="0" cy="0"/>
+          <a:chOff x="0" y="0"/>
+          <a:chExt cx="0" cy="0"/>
+        </a:xfrm>
+      </p:grpSpPr>
       <p:pic>
         <p:nvPicPr>
-          <p:cNvPr id="3" name="Picture 2" descr="truncated_b0_leaky2_reduced_layers_3_2025-03-02_09-34.png"/>
+          <p:cNvPr id="2" name="Picture 1" descr="truncated_b0_reduced_layers_0_2025-03-01_16-37.png"/>
           <p:cNvPicPr>
             <a:picLocks noChangeAspect="1"/>
           </p:cNvPicPr>
@@ -3267,7 +3741,7 @@
         <p:spPr>
           <a:xfrm>
             <a:off x="914400" y="1371600"/>
-            <a:ext cx="5486400" cy="4114800"/>
+            <a:ext cx="7315200" cy="5486400"/>
           </a:xfrm>
           <a:prstGeom prst="rect">
             <a:avLst/>
@@ -3283,7 +3757,7 @@
 </file>
 
 <file path=ppt/slides/slide12.xml><?xml version="1.0" encoding="utf-8"?>
-<p:sld xmlns:a="http://schemas.openxmlformats.org/drawingml/2006/main" xmlns:p="http://schemas.openxmlformats.org/presentationml/2006/main" xmlns:r="http://schemas.openxmlformats.org/officeDocument/2006/relationships">
+<p:sld xmlns:a="http://schemas.openxmlformats.org/drawingml/2006/main" xmlns:r="http://schemas.openxmlformats.org/officeDocument/2006/relationships" xmlns:p="http://schemas.openxmlformats.org/presentationml/2006/main">
   <p:cSld>
     <p:spTree>
       <p:nvGrpSpPr>
@@ -3291,31 +3765,17 @@
         <p:cNvGrpSpPr/>
         <p:nvPr/>
       </p:nvGrpSpPr>
-      <p:grpSpPr/>
-      <p:sp>
-        <p:nvSpPr>
-          <p:cNvPr id="2" name="Title 1"/>
-          <p:cNvSpPr>
-            <a:spLocks noGrp="1"/>
-          </p:cNvSpPr>
-          <p:nvPr>
-            <p:ph type="title"/>
-          </p:nvPr>
-        </p:nvSpPr>
-        <p:spPr/>
-        <p:txBody>
-          <a:bodyPr/>
-          <a:lstStyle/>
-          <a:p>
-            <a:r>
-              <a:t>truncated_b0_leaky_reduced_layers_0_2025-03-02_00-41</a:t>
-            </a:r>
-          </a:p>
-        </p:txBody>
-      </p:sp>
+      <p:grpSpPr>
+        <a:xfrm>
+          <a:off x="0" y="0"/>
+          <a:ext cx="0" cy="0"/>
+          <a:chOff x="0" y="0"/>
+          <a:chExt cx="0" cy="0"/>
+        </a:xfrm>
+      </p:grpSpPr>
       <p:pic>
         <p:nvPicPr>
-          <p:cNvPr id="3" name="Picture 2" descr="truncated_b0_leaky_reduced_layers_0_2025-03-02_00-41.png"/>
+          <p:cNvPr id="2" name="Picture 1" descr="truncated_b0_reduced_layers_0_2025-03-01_19-17.png"/>
           <p:cNvPicPr>
             <a:picLocks noChangeAspect="1"/>
           </p:cNvPicPr>
@@ -3330,7 +3790,7 @@
         <p:spPr>
           <a:xfrm>
             <a:off x="914400" y="1371600"/>
-            <a:ext cx="5486400" cy="4114800"/>
+            <a:ext cx="7315200" cy="5486400"/>
           </a:xfrm>
           <a:prstGeom prst="rect">
             <a:avLst/>
@@ -3346,7 +3806,7 @@
 </file>
 
 <file path=ppt/slides/slide13.xml><?xml version="1.0" encoding="utf-8"?>
-<p:sld xmlns:a="http://schemas.openxmlformats.org/drawingml/2006/main" xmlns:p="http://schemas.openxmlformats.org/presentationml/2006/main" xmlns:r="http://schemas.openxmlformats.org/officeDocument/2006/relationships">
+<p:sld xmlns:a="http://schemas.openxmlformats.org/drawingml/2006/main" xmlns:r="http://schemas.openxmlformats.org/officeDocument/2006/relationships" xmlns:p="http://schemas.openxmlformats.org/presentationml/2006/main">
   <p:cSld>
     <p:spTree>
       <p:nvGrpSpPr>
@@ -3354,31 +3814,17 @@
         <p:cNvGrpSpPr/>
         <p:nvPr/>
       </p:nvGrpSpPr>
-      <p:grpSpPr/>
-      <p:sp>
-        <p:nvSpPr>
-          <p:cNvPr id="2" name="Title 1"/>
-          <p:cNvSpPr>
-            <a:spLocks noGrp="1"/>
-          </p:cNvSpPr>
-          <p:nvPr>
-            <p:ph type="title"/>
-          </p:nvPr>
-        </p:nvSpPr>
-        <p:spPr/>
-        <p:txBody>
-          <a:bodyPr/>
-          <a:lstStyle/>
-          <a:p>
-            <a:r>
-              <a:t>truncated_b0_leaky_reduced_layers_2_2025-03-02_03-06</a:t>
-            </a:r>
-          </a:p>
-        </p:txBody>
-      </p:sp>
+      <p:grpSpPr>
+        <a:xfrm>
+          <a:off x="0" y="0"/>
+          <a:ext cx="0" cy="0"/>
+          <a:chOff x="0" y="0"/>
+          <a:chExt cx="0" cy="0"/>
+        </a:xfrm>
+      </p:grpSpPr>
       <p:pic>
         <p:nvPicPr>
-          <p:cNvPr id="3" name="Picture 2" descr="truncated_b0_leaky_reduced_layers_2_2025-03-02_03-06.png"/>
+          <p:cNvPr id="2" name="Picture 1" descr="truncated_b0_reduced_layers_1_2025-03-01_20-32.png"/>
           <p:cNvPicPr>
             <a:picLocks noChangeAspect="1"/>
           </p:cNvPicPr>
@@ -3393,7 +3839,7 @@
         <p:spPr>
           <a:xfrm>
             <a:off x="914400" y="1371600"/>
-            <a:ext cx="5486400" cy="4114800"/>
+            <a:ext cx="7315200" cy="5486400"/>
           </a:xfrm>
           <a:prstGeom prst="rect">
             <a:avLst/>
@@ -3409,7 +3855,7 @@
 </file>
 
 <file path=ppt/slides/slide14.xml><?xml version="1.0" encoding="utf-8"?>
-<p:sld xmlns:a="http://schemas.openxmlformats.org/drawingml/2006/main" xmlns:p="http://schemas.openxmlformats.org/presentationml/2006/main" xmlns:r="http://schemas.openxmlformats.org/officeDocument/2006/relationships">
+<p:sld xmlns:a="http://schemas.openxmlformats.org/drawingml/2006/main" xmlns:r="http://schemas.openxmlformats.org/officeDocument/2006/relationships" xmlns:p="http://schemas.openxmlformats.org/presentationml/2006/main">
   <p:cSld>
     <p:spTree>
       <p:nvGrpSpPr>
@@ -3417,38 +3863,24 @@
         <p:cNvGrpSpPr/>
         <p:nvPr/>
       </p:nvGrpSpPr>
-      <p:grpSpPr/>
-      <p:sp>
-        <p:nvSpPr>
-          <p:cNvPr id="2" name="Title 1"/>
-          <p:cNvSpPr>
-            <a:spLocks noGrp="1"/>
-          </p:cNvSpPr>
-          <p:nvPr>
-            <p:ph type="title"/>
-          </p:nvPr>
-        </p:nvSpPr>
-        <p:spPr/>
-        <p:txBody>
-          <a:bodyPr/>
-          <a:lstStyle/>
-          <a:p>
-            <a:r>
-              <a:t>truncated_b0_reduced_layers_0_2025-03-01_19-17</a:t>
-            </a:r>
-          </a:p>
-        </p:txBody>
-      </p:sp>
+      <p:grpSpPr>
+        <a:xfrm>
+          <a:off x="0" y="0"/>
+          <a:ext cx="0" cy="0"/>
+          <a:chOff x="0" y="0"/>
+          <a:chExt cx="0" cy="0"/>
+        </a:xfrm>
+      </p:grpSpPr>
       <p:pic>
         <p:nvPicPr>
-          <p:cNvPr id="3" name="Picture 2" descr="truncated_b0_reduced_layers_0_2025-03-01_19-17.png"/>
+          <p:cNvPr id="2" name="Picture 1" descr="truncated_b0_reduced_layers_2_2025-03-01_21-42.png"/>
           <p:cNvPicPr>
             <a:picLocks noChangeAspect="1"/>
           </p:cNvPicPr>
           <p:nvPr/>
         </p:nvPicPr>
         <p:blipFill>
-          <a:blip r:embed="rId2"/>
+          <a:blip r:embed="rId3"/>
           <a:stretch>
             <a:fillRect/>
           </a:stretch>
@@ -3456,7 +3888,7 @@
         <p:spPr>
           <a:xfrm>
             <a:off x="914400" y="1371600"/>
-            <a:ext cx="5486400" cy="4114800"/>
+            <a:ext cx="7315200" cy="5486400"/>
           </a:xfrm>
           <a:prstGeom prst="rect">
             <a:avLst/>
@@ -3472,7 +3904,7 @@
 </file>
 
 <file path=ppt/slides/slide15.xml><?xml version="1.0" encoding="utf-8"?>
-<p:sld xmlns:a="http://schemas.openxmlformats.org/drawingml/2006/main" xmlns:p="http://schemas.openxmlformats.org/presentationml/2006/main" xmlns:r="http://schemas.openxmlformats.org/officeDocument/2006/relationships">
+<p:sld xmlns:a="http://schemas.openxmlformats.org/drawingml/2006/main" xmlns:r="http://schemas.openxmlformats.org/officeDocument/2006/relationships" xmlns:p="http://schemas.openxmlformats.org/presentationml/2006/main">
   <p:cSld>
     <p:spTree>
       <p:nvGrpSpPr>
@@ -3480,31 +3912,17 @@
         <p:cNvGrpSpPr/>
         <p:nvPr/>
       </p:nvGrpSpPr>
-      <p:grpSpPr/>
-      <p:sp>
-        <p:nvSpPr>
-          <p:cNvPr id="2" name="Title 1"/>
-          <p:cNvSpPr>
-            <a:spLocks noGrp="1"/>
-          </p:cNvSpPr>
-          <p:nvPr>
-            <p:ph type="title"/>
-          </p:nvPr>
-        </p:nvSpPr>
-        <p:spPr/>
-        <p:txBody>
-          <a:bodyPr/>
-          <a:lstStyle/>
-          <a:p>
-            <a:r>
-              <a:t>truncated_b0_reduced_layers_2_2025-03-01_21-42</a:t>
-            </a:r>
-          </a:p>
-        </p:txBody>
-      </p:sp>
+      <p:grpSpPr>
+        <a:xfrm>
+          <a:off x="0" y="0"/>
+          <a:ext cx="0" cy="0"/>
+          <a:chOff x="0" y="0"/>
+          <a:chExt cx="0" cy="0"/>
+        </a:xfrm>
+      </p:grpSpPr>
       <p:pic>
         <p:nvPicPr>
-          <p:cNvPr id="3" name="Picture 2" descr="truncated_b0_reduced_layers_2_2025-03-01_21-42.png"/>
+          <p:cNvPr id="2" name="Picture 1" descr="truncated_b0_reduced_layers_3_2025-03-01_22-45.png"/>
           <p:cNvPicPr>
             <a:picLocks noChangeAspect="1"/>
           </p:cNvPicPr>
@@ -3519,7 +3937,7 @@
         <p:spPr>
           <a:xfrm>
             <a:off x="914400" y="1371600"/>
-            <a:ext cx="5486400" cy="4114800"/>
+            <a:ext cx="7315200" cy="5486400"/>
           </a:xfrm>
           <a:prstGeom prst="rect">
             <a:avLst/>
@@ -3535,7 +3953,7 @@
 </file>
 
 <file path=ppt/slides/slide16.xml><?xml version="1.0" encoding="utf-8"?>
-<p:sld xmlns:a="http://schemas.openxmlformats.org/drawingml/2006/main" xmlns:p="http://schemas.openxmlformats.org/presentationml/2006/main" xmlns:r="http://schemas.openxmlformats.org/officeDocument/2006/relationships">
+<p:sld xmlns:a="http://schemas.openxmlformats.org/drawingml/2006/main" xmlns:r="http://schemas.openxmlformats.org/officeDocument/2006/relationships" xmlns:p="http://schemas.openxmlformats.org/presentationml/2006/main">
   <p:cSld>
     <p:spTree>
       <p:nvGrpSpPr>
@@ -3543,31 +3961,17 @@
         <p:cNvGrpSpPr/>
         <p:nvPr/>
       </p:nvGrpSpPr>
-      <p:grpSpPr/>
-      <p:sp>
-        <p:nvSpPr>
-          <p:cNvPr id="2" name="Title 1"/>
-          <p:cNvSpPr>
-            <a:spLocks noGrp="1"/>
-          </p:cNvSpPr>
-          <p:nvPr>
-            <p:ph type="title"/>
-          </p:nvPr>
-        </p:nvSpPr>
-        <p:spPr/>
-        <p:txBody>
-          <a:bodyPr/>
-          <a:lstStyle/>
-          <a:p>
-            <a:r>
-              <a:t>truncated_b0_leaky_reduced_layers_3_2025-03-02_04-10</a:t>
-            </a:r>
-          </a:p>
-        </p:txBody>
-      </p:sp>
+      <p:grpSpPr>
+        <a:xfrm>
+          <a:off x="0" y="0"/>
+          <a:ext cx="0" cy="0"/>
+          <a:chOff x="0" y="0"/>
+          <a:chExt cx="0" cy="0"/>
+        </a:xfrm>
+      </p:grpSpPr>
       <p:pic>
         <p:nvPicPr>
-          <p:cNvPr id="3" name="Picture 2" descr="truncated_b0_leaky_reduced_layers_3_2025-03-02_04-10.png"/>
+          <p:cNvPr id="2" name="Picture 1" descr="truncated_b0_reduced_layers_4_2025-03-01_23-46.png"/>
           <p:cNvPicPr>
             <a:picLocks noChangeAspect="1"/>
           </p:cNvPicPr>
@@ -3582,7 +3986,7 @@
         <p:spPr>
           <a:xfrm>
             <a:off x="914400" y="1371600"/>
-            <a:ext cx="5486400" cy="4114800"/>
+            <a:ext cx="7315200" cy="5486400"/>
           </a:xfrm>
           <a:prstGeom prst="rect">
             <a:avLst/>
@@ -3597,8 +4001,8 @@
 </p:sld>
 </file>
 
-<file path=ppt/slides/slide2.xml><?xml version="1.0" encoding="utf-8"?>
-<p:sld xmlns:a="http://schemas.openxmlformats.org/drawingml/2006/main" xmlns:p="http://schemas.openxmlformats.org/presentationml/2006/main" xmlns:r="http://schemas.openxmlformats.org/officeDocument/2006/relationships">
+<file path=ppt/slides/slide17.xml><?xml version="1.0" encoding="utf-8"?>
+<p:sld xmlns:a="http://schemas.openxmlformats.org/drawingml/2006/main" xmlns:r="http://schemas.openxmlformats.org/officeDocument/2006/relationships" xmlns:p="http://schemas.openxmlformats.org/presentationml/2006/main">
   <p:cSld>
     <p:spTree>
       <p:nvGrpSpPr>
@@ -3606,31 +4010,77 @@
         <p:cNvGrpSpPr/>
         <p:nvPr/>
       </p:nvGrpSpPr>
-      <p:grpSpPr/>
-      <p:sp>
-        <p:nvSpPr>
-          <p:cNvPr id="2" name="Title 1"/>
-          <p:cNvSpPr>
-            <a:spLocks noGrp="1"/>
-          </p:cNvSpPr>
-          <p:nvPr>
-            <p:ph type="title"/>
-          </p:nvPr>
-        </p:nvSpPr>
-        <p:spPr/>
-        <p:txBody>
-          <a:bodyPr/>
-          <a:lstStyle/>
-          <a:p>
-            <a:r>
-              <a:t>truncated_b0_leaky_reduced_layers_1_2025-03-02_01-56</a:t>
-            </a:r>
-          </a:p>
-        </p:txBody>
-      </p:sp>
+      <p:grpSpPr>
+        <a:xfrm>
+          <a:off x="0" y="0"/>
+          <a:ext cx="0" cy="0"/>
+          <a:chOff x="0" y="0"/>
+          <a:chExt cx="0" cy="0"/>
+        </a:xfrm>
+      </p:grpSpPr>
       <p:pic>
         <p:nvPicPr>
-          <p:cNvPr id="3" name="Picture 2" descr="truncated_b0_leaky_reduced_layers_1_2025-03-02_01-56.png"/>
+          <p:cNvPr id="2" name="Picture 1">
+            <a:extLst>
+              <a:ext uri="{FF2B5EF4-FFF2-40B4-BE49-F238E27FC236}">
+                <a16:creationId xmlns:a16="http://schemas.microsoft.com/office/drawing/2014/main" id="{F8690BAE-4525-3C94-3BE6-22E4E968CE1B}"/>
+              </a:ext>
+            </a:extLst>
+          </p:cNvPr>
+          <p:cNvPicPr>
+            <a:picLocks noChangeAspect="1"/>
+          </p:cNvPicPr>
+          <p:nvPr/>
+        </p:nvPicPr>
+        <p:blipFill>
+          <a:blip r:embed="rId3"/>
+          <a:stretch>
+            <a:fillRect/>
+          </a:stretch>
+        </p:blipFill>
+        <p:spPr>
+          <a:xfrm>
+            <a:off x="428718" y="2065784"/>
+            <a:ext cx="8286563" cy="2726431"/>
+          </a:xfrm>
+          <a:prstGeom prst="rect">
+            <a:avLst/>
+          </a:prstGeom>
+        </p:spPr>
+      </p:pic>
+    </p:spTree>
+    <p:extLst>
+      <p:ext uri="{BB962C8B-B14F-4D97-AF65-F5344CB8AC3E}">
+        <p14:creationId xmlns:p14="http://schemas.microsoft.com/office/powerpoint/2010/main" val="300016485"/>
+      </p:ext>
+    </p:extLst>
+  </p:cSld>
+  <p:clrMapOvr>
+    <a:masterClrMapping/>
+  </p:clrMapOvr>
+</p:sld>
+</file>
+
+<file path=ppt/slides/slide2.xml><?xml version="1.0" encoding="utf-8"?>
+<p:sld xmlns:a="http://schemas.openxmlformats.org/drawingml/2006/main" xmlns:r="http://schemas.openxmlformats.org/officeDocument/2006/relationships" xmlns:p="http://schemas.openxmlformats.org/presentationml/2006/main">
+  <p:cSld>
+    <p:spTree>
+      <p:nvGrpSpPr>
+        <p:cNvPr id="1" name=""/>
+        <p:cNvGrpSpPr/>
+        <p:nvPr/>
+      </p:nvGrpSpPr>
+      <p:grpSpPr>
+        <a:xfrm>
+          <a:off x="0" y="0"/>
+          <a:ext cx="0" cy="0"/>
+          <a:chOff x="0" y="0"/>
+          <a:chExt cx="0" cy="0"/>
+        </a:xfrm>
+      </p:grpSpPr>
+      <p:pic>
+        <p:nvPicPr>
+          <p:cNvPr id="2" name="Picture 1" descr="truncated_b0_leaky2_reduced_layers_1_2025-03-02_07-21.png"/>
           <p:cNvPicPr>
             <a:picLocks noChangeAspect="1"/>
           </p:cNvPicPr>
@@ -3645,7 +4095,7 @@
         <p:spPr>
           <a:xfrm>
             <a:off x="914400" y="1371600"/>
-            <a:ext cx="5486400" cy="4114800"/>
+            <a:ext cx="7315200" cy="5486400"/>
           </a:xfrm>
           <a:prstGeom prst="rect">
             <a:avLst/>
@@ -3661,7 +4111,7 @@
 </file>
 
 <file path=ppt/slides/slide3.xml><?xml version="1.0" encoding="utf-8"?>
-<p:sld xmlns:a="http://schemas.openxmlformats.org/drawingml/2006/main" xmlns:p="http://schemas.openxmlformats.org/presentationml/2006/main" xmlns:r="http://schemas.openxmlformats.org/officeDocument/2006/relationships">
+<p:sld xmlns:a="http://schemas.openxmlformats.org/drawingml/2006/main" xmlns:r="http://schemas.openxmlformats.org/officeDocument/2006/relationships" xmlns:p="http://schemas.openxmlformats.org/presentationml/2006/main">
   <p:cSld>
     <p:spTree>
       <p:nvGrpSpPr>
@@ -3669,31 +4119,17 @@
         <p:cNvGrpSpPr/>
         <p:nvPr/>
       </p:nvGrpSpPr>
-      <p:grpSpPr/>
-      <p:sp>
-        <p:nvSpPr>
-          <p:cNvPr id="2" name="Title 1"/>
-          <p:cNvSpPr>
-            <a:spLocks noGrp="1"/>
-          </p:cNvSpPr>
-          <p:nvPr>
-            <p:ph type="title"/>
-          </p:nvPr>
-        </p:nvSpPr>
-        <p:spPr/>
-        <p:txBody>
-          <a:bodyPr/>
-          <a:lstStyle/>
-          <a:p>
-            <a:r>
-              <a:t>truncated_b0_leaky2_reduced_layers_0_2025-03-02_06-05</a:t>
-            </a:r>
-          </a:p>
-        </p:txBody>
-      </p:sp>
+      <p:grpSpPr>
+        <a:xfrm>
+          <a:off x="0" y="0"/>
+          <a:ext cx="0" cy="0"/>
+          <a:chOff x="0" y="0"/>
+          <a:chExt cx="0" cy="0"/>
+        </a:xfrm>
+      </p:grpSpPr>
       <p:pic>
         <p:nvPicPr>
-          <p:cNvPr id="3" name="Picture 2" descr="truncated_b0_leaky2_reduced_layers_0_2025-03-02_06-05.png"/>
+          <p:cNvPr id="2" name="Picture 1" descr="truncated_b0_leaky2_reduced_layers_2_2025-03-02_08-31.png"/>
           <p:cNvPicPr>
             <a:picLocks noChangeAspect="1"/>
           </p:cNvPicPr>
@@ -3708,7 +4144,7 @@
         <p:spPr>
           <a:xfrm>
             <a:off x="914400" y="1371600"/>
-            <a:ext cx="5486400" cy="4114800"/>
+            <a:ext cx="7315200" cy="5486400"/>
           </a:xfrm>
           <a:prstGeom prst="rect">
             <a:avLst/>
@@ -3724,7 +4160,7 @@
 </file>
 
 <file path=ppt/slides/slide4.xml><?xml version="1.0" encoding="utf-8"?>
-<p:sld xmlns:a="http://schemas.openxmlformats.org/drawingml/2006/main" xmlns:p="http://schemas.openxmlformats.org/presentationml/2006/main" xmlns:r="http://schemas.openxmlformats.org/officeDocument/2006/relationships">
+<p:sld xmlns:a="http://schemas.openxmlformats.org/drawingml/2006/main" xmlns:r="http://schemas.openxmlformats.org/officeDocument/2006/relationships" xmlns:p="http://schemas.openxmlformats.org/presentationml/2006/main">
   <p:cSld>
     <p:spTree>
       <p:nvGrpSpPr>
@@ -3732,31 +4168,17 @@
         <p:cNvGrpSpPr/>
         <p:nvPr/>
       </p:nvGrpSpPr>
-      <p:grpSpPr/>
-      <p:sp>
-        <p:nvSpPr>
-          <p:cNvPr id="2" name="Title 1"/>
-          <p:cNvSpPr>
-            <a:spLocks noGrp="1"/>
-          </p:cNvSpPr>
-          <p:nvPr>
-            <p:ph type="title"/>
-          </p:nvPr>
-        </p:nvSpPr>
-        <p:spPr/>
-        <p:txBody>
-          <a:bodyPr/>
-          <a:lstStyle/>
-          <a:p>
-            <a:r>
-              <a:t>truncated_b0_reduced_layers_4_2025-03-01_23-46</a:t>
-            </a:r>
-          </a:p>
-        </p:txBody>
-      </p:sp>
+      <p:grpSpPr>
+        <a:xfrm>
+          <a:off x="0" y="0"/>
+          <a:ext cx="0" cy="0"/>
+          <a:chOff x="0" y="0"/>
+          <a:chExt cx="0" cy="0"/>
+        </a:xfrm>
+      </p:grpSpPr>
       <p:pic>
         <p:nvPicPr>
-          <p:cNvPr id="3" name="Picture 2" descr="truncated_b0_reduced_layers_4_2025-03-01_23-46.png"/>
+          <p:cNvPr id="2" name="Picture 1" descr="truncated_b0_leaky2_reduced_layers_3_2025-03-02_09-34.png"/>
           <p:cNvPicPr>
             <a:picLocks noChangeAspect="1"/>
           </p:cNvPicPr>
@@ -3771,7 +4193,7 @@
         <p:spPr>
           <a:xfrm>
             <a:off x="914400" y="1371600"/>
-            <a:ext cx="5486400" cy="4114800"/>
+            <a:ext cx="7315200" cy="5486400"/>
           </a:xfrm>
           <a:prstGeom prst="rect">
             <a:avLst/>
@@ -3787,7 +4209,7 @@
 </file>
 
 <file path=ppt/slides/slide5.xml><?xml version="1.0" encoding="utf-8"?>
-<p:sld xmlns:a="http://schemas.openxmlformats.org/drawingml/2006/main" xmlns:p="http://schemas.openxmlformats.org/presentationml/2006/main" xmlns:r="http://schemas.openxmlformats.org/officeDocument/2006/relationships">
+<p:sld xmlns:a="http://schemas.openxmlformats.org/drawingml/2006/main" xmlns:r="http://schemas.openxmlformats.org/officeDocument/2006/relationships" xmlns:p="http://schemas.openxmlformats.org/presentationml/2006/main">
   <p:cSld>
     <p:spTree>
       <p:nvGrpSpPr>
@@ -3795,31 +4217,17 @@
         <p:cNvGrpSpPr/>
         <p:nvPr/>
       </p:nvGrpSpPr>
-      <p:grpSpPr/>
-      <p:sp>
-        <p:nvSpPr>
-          <p:cNvPr id="2" name="Title 1"/>
-          <p:cNvSpPr>
-            <a:spLocks noGrp="1"/>
-          </p:cNvSpPr>
-          <p:nvPr>
-            <p:ph type="title"/>
-          </p:nvPr>
-        </p:nvSpPr>
-        <p:spPr/>
-        <p:txBody>
-          <a:bodyPr/>
-          <a:lstStyle/>
-          <a:p>
-            <a:r>
-              <a:t>truncated_b0_leaky2_reduced_layers_1_2025-03-02_07-21</a:t>
-            </a:r>
-          </a:p>
-        </p:txBody>
-      </p:sp>
+      <p:grpSpPr>
+        <a:xfrm>
+          <a:off x="0" y="0"/>
+          <a:ext cx="0" cy="0"/>
+          <a:chOff x="0" y="0"/>
+          <a:chExt cx="0" cy="0"/>
+        </a:xfrm>
+      </p:grpSpPr>
       <p:pic>
         <p:nvPicPr>
-          <p:cNvPr id="3" name="Picture 2" descr="truncated_b0_leaky2_reduced_layers_1_2025-03-02_07-21.png"/>
+          <p:cNvPr id="2" name="Picture 1" descr="truncated_b0_leaky2_reduced_layers_4_2025-03-02_10-37.png"/>
           <p:cNvPicPr>
             <a:picLocks noChangeAspect="1"/>
           </p:cNvPicPr>
@@ -3834,7 +4242,7 @@
         <p:spPr>
           <a:xfrm>
             <a:off x="914400" y="1371600"/>
-            <a:ext cx="5486400" cy="4114800"/>
+            <a:ext cx="7315200" cy="5486400"/>
           </a:xfrm>
           <a:prstGeom prst="rect">
             <a:avLst/>
@@ -3850,7 +4258,7 @@
 </file>
 
 <file path=ppt/slides/slide6.xml><?xml version="1.0" encoding="utf-8"?>
-<p:sld xmlns:a="http://schemas.openxmlformats.org/drawingml/2006/main" xmlns:p="http://schemas.openxmlformats.org/presentationml/2006/main" xmlns:r="http://schemas.openxmlformats.org/officeDocument/2006/relationships">
+<p:sld xmlns:a="http://schemas.openxmlformats.org/drawingml/2006/main" xmlns:r="http://schemas.openxmlformats.org/officeDocument/2006/relationships" xmlns:p="http://schemas.openxmlformats.org/presentationml/2006/main">
   <p:cSld>
     <p:spTree>
       <p:nvGrpSpPr>
@@ -3858,31 +4266,17 @@
         <p:cNvGrpSpPr/>
         <p:nvPr/>
       </p:nvGrpSpPr>
-      <p:grpSpPr/>
-      <p:sp>
-        <p:nvSpPr>
-          <p:cNvPr id="2" name="Title 1"/>
-          <p:cNvSpPr>
-            <a:spLocks noGrp="1"/>
-          </p:cNvSpPr>
-          <p:nvPr>
-            <p:ph type="title"/>
-          </p:nvPr>
-        </p:nvSpPr>
-        <p:spPr/>
-        <p:txBody>
-          <a:bodyPr/>
-          <a:lstStyle/>
-          <a:p>
-            <a:r>
-              <a:t>truncated_b0_reduced_layers_0_2025-03-01_16-37</a:t>
-            </a:r>
-          </a:p>
-        </p:txBody>
-      </p:sp>
+      <p:grpSpPr>
+        <a:xfrm>
+          <a:off x="0" y="0"/>
+          <a:ext cx="0" cy="0"/>
+          <a:chOff x="0" y="0"/>
+          <a:chExt cx="0" cy="0"/>
+        </a:xfrm>
+      </p:grpSpPr>
       <p:pic>
         <p:nvPicPr>
-          <p:cNvPr id="3" name="Picture 2" descr="truncated_b0_reduced_layers_0_2025-03-01_16-37.png"/>
+          <p:cNvPr id="2" name="Picture 1" descr="truncated_b0_leaky_reduced_layers_0_2025-03-02_00-41.png"/>
           <p:cNvPicPr>
             <a:picLocks noChangeAspect="1"/>
           </p:cNvPicPr>
@@ -3897,7 +4291,7 @@
         <p:spPr>
           <a:xfrm>
             <a:off x="914400" y="1371600"/>
-            <a:ext cx="5486400" cy="4114800"/>
+            <a:ext cx="7315200" cy="5486400"/>
           </a:xfrm>
           <a:prstGeom prst="rect">
             <a:avLst/>
@@ -3913,7 +4307,7 @@
 </file>
 
 <file path=ppt/slides/slide7.xml><?xml version="1.0" encoding="utf-8"?>
-<p:sld xmlns:a="http://schemas.openxmlformats.org/drawingml/2006/main" xmlns:p="http://schemas.openxmlformats.org/presentationml/2006/main" xmlns:r="http://schemas.openxmlformats.org/officeDocument/2006/relationships">
+<p:sld xmlns:a="http://schemas.openxmlformats.org/drawingml/2006/main" xmlns:r="http://schemas.openxmlformats.org/officeDocument/2006/relationships" xmlns:p="http://schemas.openxmlformats.org/presentationml/2006/main">
   <p:cSld>
     <p:spTree>
       <p:nvGrpSpPr>
@@ -3921,31 +4315,17 @@
         <p:cNvGrpSpPr/>
         <p:nvPr/>
       </p:nvGrpSpPr>
-      <p:grpSpPr/>
-      <p:sp>
-        <p:nvSpPr>
-          <p:cNvPr id="2" name="Title 1"/>
-          <p:cNvSpPr>
-            <a:spLocks noGrp="1"/>
-          </p:cNvSpPr>
-          <p:nvPr>
-            <p:ph type="title"/>
-          </p:nvPr>
-        </p:nvSpPr>
-        <p:spPr/>
-        <p:txBody>
-          <a:bodyPr/>
-          <a:lstStyle/>
-          <a:p>
-            <a:r>
-              <a:t>truncated_b0_reduced_layers_1_2025-03-01_20-32</a:t>
-            </a:r>
-          </a:p>
-        </p:txBody>
-      </p:sp>
+      <p:grpSpPr>
+        <a:xfrm>
+          <a:off x="0" y="0"/>
+          <a:ext cx="0" cy="0"/>
+          <a:chOff x="0" y="0"/>
+          <a:chExt cx="0" cy="0"/>
+        </a:xfrm>
+      </p:grpSpPr>
       <p:pic>
         <p:nvPicPr>
-          <p:cNvPr id="3" name="Picture 2" descr="truncated_b0_reduced_layers_1_2025-03-01_20-32.png"/>
+          <p:cNvPr id="2" name="Picture 1" descr="truncated_b0_leaky_reduced_layers_1_2025-03-02_01-56.png"/>
           <p:cNvPicPr>
             <a:picLocks noChangeAspect="1"/>
           </p:cNvPicPr>
@@ -3960,7 +4340,7 @@
         <p:spPr>
           <a:xfrm>
             <a:off x="914400" y="1371600"/>
-            <a:ext cx="5486400" cy="4114800"/>
+            <a:ext cx="7315200" cy="5486400"/>
           </a:xfrm>
           <a:prstGeom prst="rect">
             <a:avLst/>
@@ -3976,7 +4356,7 @@
 </file>
 
 <file path=ppt/slides/slide8.xml><?xml version="1.0" encoding="utf-8"?>
-<p:sld xmlns:a="http://schemas.openxmlformats.org/drawingml/2006/main" xmlns:p="http://schemas.openxmlformats.org/presentationml/2006/main" xmlns:r="http://schemas.openxmlformats.org/officeDocument/2006/relationships">
+<p:sld xmlns:a="http://schemas.openxmlformats.org/drawingml/2006/main" xmlns:r="http://schemas.openxmlformats.org/officeDocument/2006/relationships" xmlns:p="http://schemas.openxmlformats.org/presentationml/2006/main">
   <p:cSld>
     <p:spTree>
       <p:nvGrpSpPr>
@@ -3984,31 +4364,17 @@
         <p:cNvGrpSpPr/>
         <p:nvPr/>
       </p:nvGrpSpPr>
-      <p:grpSpPr/>
-      <p:sp>
-        <p:nvSpPr>
-          <p:cNvPr id="2" name="Title 1"/>
-          <p:cNvSpPr>
-            <a:spLocks noGrp="1"/>
-          </p:cNvSpPr>
-          <p:nvPr>
-            <p:ph type="title"/>
-          </p:nvPr>
-        </p:nvSpPr>
-        <p:spPr/>
-        <p:txBody>
-          <a:bodyPr/>
-          <a:lstStyle/>
-          <a:p>
-            <a:r>
-              <a:t>truncated_b0_leaky2_reduced_layers_4_2025-03-02_10-37</a:t>
-            </a:r>
-          </a:p>
-        </p:txBody>
-      </p:sp>
+      <p:grpSpPr>
+        <a:xfrm>
+          <a:off x="0" y="0"/>
+          <a:ext cx="0" cy="0"/>
+          <a:chOff x="0" y="0"/>
+          <a:chExt cx="0" cy="0"/>
+        </a:xfrm>
+      </p:grpSpPr>
       <p:pic>
         <p:nvPicPr>
-          <p:cNvPr id="3" name="Picture 2" descr="truncated_b0_leaky2_reduced_layers_4_2025-03-02_10-37.png"/>
+          <p:cNvPr id="2" name="Picture 1" descr="truncated_b0_leaky_reduced_layers_2_2025-03-02_03-06.png"/>
           <p:cNvPicPr>
             <a:picLocks noChangeAspect="1"/>
           </p:cNvPicPr>
@@ -4023,7 +4389,7 @@
         <p:spPr>
           <a:xfrm>
             <a:off x="914400" y="1371600"/>
-            <a:ext cx="5486400" cy="4114800"/>
+            <a:ext cx="7315200" cy="5486400"/>
           </a:xfrm>
           <a:prstGeom prst="rect">
             <a:avLst/>
@@ -4039,7 +4405,7 @@
 </file>
 
 <file path=ppt/slides/slide9.xml><?xml version="1.0" encoding="utf-8"?>
-<p:sld xmlns:a="http://schemas.openxmlformats.org/drawingml/2006/main" xmlns:p="http://schemas.openxmlformats.org/presentationml/2006/main" xmlns:r="http://schemas.openxmlformats.org/officeDocument/2006/relationships">
+<p:sld xmlns:a="http://schemas.openxmlformats.org/drawingml/2006/main" xmlns:r="http://schemas.openxmlformats.org/officeDocument/2006/relationships" xmlns:p="http://schemas.openxmlformats.org/presentationml/2006/main">
   <p:cSld>
     <p:spTree>
       <p:nvGrpSpPr>
@@ -4047,31 +4413,17 @@
         <p:cNvGrpSpPr/>
         <p:nvPr/>
       </p:nvGrpSpPr>
-      <p:grpSpPr/>
-      <p:sp>
-        <p:nvSpPr>
-          <p:cNvPr id="2" name="Title 1"/>
-          <p:cNvSpPr>
-            <a:spLocks noGrp="1"/>
-          </p:cNvSpPr>
-          <p:nvPr>
-            <p:ph type="title"/>
-          </p:nvPr>
-        </p:nvSpPr>
-        <p:spPr/>
-        <p:txBody>
-          <a:bodyPr/>
-          <a:lstStyle/>
-          <a:p>
-            <a:r>
-              <a:t>truncated_b0_reduced_layers_3_2025-03-01_22-45</a:t>
-            </a:r>
-          </a:p>
-        </p:txBody>
-      </p:sp>
+      <p:grpSpPr>
+        <a:xfrm>
+          <a:off x="0" y="0"/>
+          <a:ext cx="0" cy="0"/>
+          <a:chOff x="0" y="0"/>
+          <a:chExt cx="0" cy="0"/>
+        </a:xfrm>
+      </p:grpSpPr>
       <p:pic>
         <p:nvPicPr>
-          <p:cNvPr id="3" name="Picture 2" descr="truncated_b0_reduced_layers_3_2025-03-01_22-45.png"/>
+          <p:cNvPr id="2" name="Picture 1" descr="truncated_b0_leaky_reduced_layers_3_2025-03-02_04-10.png"/>
           <p:cNvPicPr>
             <a:picLocks noChangeAspect="1"/>
           </p:cNvPicPr>
@@ -4086,7 +4438,7 @@
         <p:spPr>
           <a:xfrm>
             <a:off x="914400" y="1371600"/>
-            <a:ext cx="5486400" cy="4114800"/>
+            <a:ext cx="7315200" cy="5486400"/>
           </a:xfrm>
           <a:prstGeom prst="rect">
             <a:avLst/>
@@ -4419,4 +4771,319 @@
   </a:objectDefaults>
   <a:extraClrSchemeLst/>
 </a:theme>
+</file>
+
+<file path=ppt/theme/theme2.xml><?xml version="1.0" encoding="utf-8"?>
+<a:theme xmlns:a="http://schemas.openxmlformats.org/drawingml/2006/main" name="Office Theme">
+  <a:themeElements>
+    <a:clrScheme name="Office">
+      <a:dk1>
+        <a:sysClr val="windowText" lastClr="000000"/>
+      </a:dk1>
+      <a:lt1>
+        <a:sysClr val="window" lastClr="FFFFFF"/>
+      </a:lt1>
+      <a:dk2>
+        <a:srgbClr val="0E2841"/>
+      </a:dk2>
+      <a:lt2>
+        <a:srgbClr val="E8E8E8"/>
+      </a:lt2>
+      <a:accent1>
+        <a:srgbClr val="156082"/>
+      </a:accent1>
+      <a:accent2>
+        <a:srgbClr val="E97132"/>
+      </a:accent2>
+      <a:accent3>
+        <a:srgbClr val="196B24"/>
+      </a:accent3>
+      <a:accent4>
+        <a:srgbClr val="0F9ED5"/>
+      </a:accent4>
+      <a:accent5>
+        <a:srgbClr val="A02B93"/>
+      </a:accent5>
+      <a:accent6>
+        <a:srgbClr val="4EA72E"/>
+      </a:accent6>
+      <a:hlink>
+        <a:srgbClr val="467886"/>
+      </a:hlink>
+      <a:folHlink>
+        <a:srgbClr val="96607D"/>
+      </a:folHlink>
+    </a:clrScheme>
+    <a:fontScheme name="Office">
+      <a:majorFont>
+        <a:latin typeface="Aptos Display" panose="02110004020202020204"/>
+        <a:ea typeface=""/>
+        <a:cs typeface=""/>
+        <a:font script="Jpan" typeface="游ゴシック Light"/>
+        <a:font script="Hang" typeface="맑은 고딕"/>
+        <a:font script="Hans" typeface="等线 Light"/>
+        <a:font script="Hant" typeface="新細明體"/>
+        <a:font script="Arab" typeface="Times New Roman"/>
+        <a:font script="Hebr" typeface="Times New Roman"/>
+        <a:font script="Thai" typeface="Angsana New"/>
+        <a:font script="Ethi" typeface="Nyala"/>
+        <a:font script="Beng" typeface="Vrinda"/>
+        <a:font script="Gujr" typeface="Shruti"/>
+        <a:font script="Khmr" typeface="MoolBoran"/>
+        <a:font script="Knda" typeface="Tunga"/>
+        <a:font script="Guru" typeface="Raavi"/>
+        <a:font script="Cans" typeface="Euphemia"/>
+        <a:font script="Cher" typeface="Plantagenet Cherokee"/>
+        <a:font script="Yiii" typeface="Microsoft Yi Baiti"/>
+        <a:font script="Tibt" typeface="Microsoft Himalaya"/>
+        <a:font script="Thaa" typeface="MV Boli"/>
+        <a:font script="Deva" typeface="Mangal"/>
+        <a:font script="Telu" typeface="Gautami"/>
+        <a:font script="Taml" typeface="Latha"/>
+        <a:font script="Syrc" typeface="Estrangelo Edessa"/>
+        <a:font script="Orya" typeface="Kalinga"/>
+        <a:font script="Mlym" typeface="Kartika"/>
+        <a:font script="Laoo" typeface="DokChampa"/>
+        <a:font script="Sinh" typeface="Iskoola Pota"/>
+        <a:font script="Mong" typeface="Mongolian Baiti"/>
+        <a:font script="Viet" typeface="Times New Roman"/>
+        <a:font script="Uigh" typeface="Microsoft Uighur"/>
+        <a:font script="Geor" typeface="Sylfaen"/>
+        <a:font script="Armn" typeface="Arial"/>
+        <a:font script="Bugi" typeface="Leelawadee UI"/>
+        <a:font script="Bopo" typeface="Microsoft JhengHei"/>
+        <a:font script="Java" typeface="Javanese Text"/>
+        <a:font script="Lisu" typeface="Segoe UI"/>
+        <a:font script="Mymr" typeface="Myanmar Text"/>
+        <a:font script="Nkoo" typeface="Ebrima"/>
+        <a:font script="Olck" typeface="Nirmala UI"/>
+        <a:font script="Osma" typeface="Ebrima"/>
+        <a:font script="Phag" typeface="Phagspa"/>
+        <a:font script="Syrn" typeface="Estrangelo Edessa"/>
+        <a:font script="Syrj" typeface="Estrangelo Edessa"/>
+        <a:font script="Syre" typeface="Estrangelo Edessa"/>
+        <a:font script="Sora" typeface="Nirmala UI"/>
+        <a:font script="Tale" typeface="Microsoft Tai Le"/>
+        <a:font script="Talu" typeface="Microsoft New Tai Lue"/>
+        <a:font script="Tfng" typeface="Ebrima"/>
+      </a:majorFont>
+      <a:minorFont>
+        <a:latin typeface="Aptos" panose="02110004020202020204"/>
+        <a:ea typeface=""/>
+        <a:cs typeface=""/>
+        <a:font script="Jpan" typeface="游ゴシック"/>
+        <a:font script="Hang" typeface="맑은 고딕"/>
+        <a:font script="Hans" typeface="等线"/>
+        <a:font script="Hant" typeface="新細明體"/>
+        <a:font script="Arab" typeface="Arial"/>
+        <a:font script="Hebr" typeface="Arial"/>
+        <a:font script="Thai" typeface="Cordia New"/>
+        <a:font script="Ethi" typeface="Nyala"/>
+        <a:font script="Beng" typeface="Vrinda"/>
+        <a:font script="Gujr" typeface="Shruti"/>
+        <a:font script="Khmr" typeface="DaunPenh"/>
+        <a:font script="Knda" typeface="Tunga"/>
+        <a:font script="Guru" typeface="Raavi"/>
+        <a:font script="Cans" typeface="Euphemia"/>
+        <a:font script="Cher" typeface="Plantagenet Cherokee"/>
+        <a:font script="Yiii" typeface="Microsoft Yi Baiti"/>
+        <a:font script="Tibt" typeface="Microsoft Himalaya"/>
+        <a:font script="Thaa" typeface="MV Boli"/>
+        <a:font script="Deva" typeface="Mangal"/>
+        <a:font script="Telu" typeface="Gautami"/>
+        <a:font script="Taml" typeface="Latha"/>
+        <a:font script="Syrc" typeface="Estrangelo Edessa"/>
+        <a:font script="Orya" typeface="Kalinga"/>
+        <a:font script="Mlym" typeface="Kartika"/>
+        <a:font script="Laoo" typeface="DokChampa"/>
+        <a:font script="Sinh" typeface="Iskoola Pota"/>
+        <a:font script="Mong" typeface="Mongolian Baiti"/>
+        <a:font script="Viet" typeface="Arial"/>
+        <a:font script="Uigh" typeface="Microsoft Uighur"/>
+        <a:font script="Geor" typeface="Sylfaen"/>
+        <a:font script="Armn" typeface="Arial"/>
+        <a:font script="Bugi" typeface="Leelawadee UI"/>
+        <a:font script="Bopo" typeface="Microsoft JhengHei"/>
+        <a:font script="Java" typeface="Javanese Text"/>
+        <a:font script="Lisu" typeface="Segoe UI"/>
+        <a:font script="Mymr" typeface="Myanmar Text"/>
+        <a:font script="Nkoo" typeface="Ebrima"/>
+        <a:font script="Olck" typeface="Nirmala UI"/>
+        <a:font script="Osma" typeface="Ebrima"/>
+        <a:font script="Phag" typeface="Phagspa"/>
+        <a:font script="Syrn" typeface="Estrangelo Edessa"/>
+        <a:font script="Syrj" typeface="Estrangelo Edessa"/>
+        <a:font script="Syre" typeface="Estrangelo Edessa"/>
+        <a:font script="Sora" typeface="Nirmala UI"/>
+        <a:font script="Tale" typeface="Microsoft Tai Le"/>
+        <a:font script="Talu" typeface="Microsoft New Tai Lue"/>
+        <a:font script="Tfng" typeface="Ebrima"/>
+      </a:minorFont>
+    </a:fontScheme>
+    <a:fmtScheme name="Office">
+      <a:fillStyleLst>
+        <a:solidFill>
+          <a:schemeClr val="phClr"/>
+        </a:solidFill>
+        <a:gradFill rotWithShape="1">
+          <a:gsLst>
+            <a:gs pos="0">
+              <a:schemeClr val="phClr">
+                <a:lumMod val="110000"/>
+                <a:satMod val="105000"/>
+                <a:tint val="67000"/>
+              </a:schemeClr>
+            </a:gs>
+            <a:gs pos="50000">
+              <a:schemeClr val="phClr">
+                <a:lumMod val="105000"/>
+                <a:satMod val="103000"/>
+                <a:tint val="73000"/>
+              </a:schemeClr>
+            </a:gs>
+            <a:gs pos="100000">
+              <a:schemeClr val="phClr">
+                <a:lumMod val="105000"/>
+                <a:satMod val="109000"/>
+                <a:tint val="81000"/>
+              </a:schemeClr>
+            </a:gs>
+          </a:gsLst>
+          <a:lin ang="5400000" scaled="0"/>
+        </a:gradFill>
+        <a:gradFill rotWithShape="1">
+          <a:gsLst>
+            <a:gs pos="0">
+              <a:schemeClr val="phClr">
+                <a:satMod val="103000"/>
+                <a:lumMod val="102000"/>
+                <a:tint val="94000"/>
+              </a:schemeClr>
+            </a:gs>
+            <a:gs pos="50000">
+              <a:schemeClr val="phClr">
+                <a:satMod val="110000"/>
+                <a:lumMod val="100000"/>
+                <a:shade val="100000"/>
+              </a:schemeClr>
+            </a:gs>
+            <a:gs pos="100000">
+              <a:schemeClr val="phClr">
+                <a:lumMod val="99000"/>
+                <a:satMod val="120000"/>
+                <a:shade val="78000"/>
+              </a:schemeClr>
+            </a:gs>
+          </a:gsLst>
+          <a:lin ang="5400000" scaled="0"/>
+        </a:gradFill>
+      </a:fillStyleLst>
+      <a:lnStyleLst>
+        <a:ln w="12700" cap="flat" cmpd="sng" algn="ctr">
+          <a:solidFill>
+            <a:schemeClr val="phClr"/>
+          </a:solidFill>
+          <a:prstDash val="solid"/>
+          <a:miter lim="800000"/>
+        </a:ln>
+        <a:ln w="19050" cap="flat" cmpd="sng" algn="ctr">
+          <a:solidFill>
+            <a:schemeClr val="phClr"/>
+          </a:solidFill>
+          <a:prstDash val="solid"/>
+          <a:miter lim="800000"/>
+        </a:ln>
+        <a:ln w="25400" cap="flat" cmpd="sng" algn="ctr">
+          <a:solidFill>
+            <a:schemeClr val="phClr"/>
+          </a:solidFill>
+          <a:prstDash val="solid"/>
+          <a:miter lim="800000"/>
+        </a:ln>
+      </a:lnStyleLst>
+      <a:effectStyleLst>
+        <a:effectStyle>
+          <a:effectLst/>
+        </a:effectStyle>
+        <a:effectStyle>
+          <a:effectLst/>
+        </a:effectStyle>
+        <a:effectStyle>
+          <a:effectLst>
+            <a:outerShdw blurRad="57150" dist="19050" dir="5400000" algn="ctr" rotWithShape="0">
+              <a:srgbClr val="000000">
+                <a:alpha val="63000"/>
+              </a:srgbClr>
+            </a:outerShdw>
+          </a:effectLst>
+        </a:effectStyle>
+      </a:effectStyleLst>
+      <a:bgFillStyleLst>
+        <a:solidFill>
+          <a:schemeClr val="phClr"/>
+        </a:solidFill>
+        <a:solidFill>
+          <a:schemeClr val="phClr">
+            <a:tint val="95000"/>
+            <a:satMod val="170000"/>
+          </a:schemeClr>
+        </a:solidFill>
+        <a:gradFill rotWithShape="1">
+          <a:gsLst>
+            <a:gs pos="0">
+              <a:schemeClr val="phClr">
+                <a:tint val="93000"/>
+                <a:satMod val="150000"/>
+                <a:shade val="98000"/>
+                <a:lumMod val="102000"/>
+              </a:schemeClr>
+            </a:gs>
+            <a:gs pos="50000">
+              <a:schemeClr val="phClr">
+                <a:tint val="98000"/>
+                <a:satMod val="130000"/>
+                <a:shade val="90000"/>
+                <a:lumMod val="103000"/>
+              </a:schemeClr>
+            </a:gs>
+            <a:gs pos="100000">
+              <a:schemeClr val="phClr">
+                <a:shade val="63000"/>
+                <a:satMod val="120000"/>
+              </a:schemeClr>
+            </a:gs>
+          </a:gsLst>
+          <a:lin ang="5400000" scaled="0"/>
+        </a:gradFill>
+      </a:bgFillStyleLst>
+    </a:fmtScheme>
+  </a:themeElements>
+  <a:objectDefaults>
+    <a:lnDef>
+      <a:spPr/>
+      <a:bodyPr/>
+      <a:lstStyle/>
+      <a:style>
+        <a:lnRef idx="2">
+          <a:schemeClr val="accent1"/>
+        </a:lnRef>
+        <a:fillRef idx="0">
+          <a:schemeClr val="accent1"/>
+        </a:fillRef>
+        <a:effectRef idx="1">
+          <a:schemeClr val="accent1"/>
+        </a:effectRef>
+        <a:fontRef idx="minor">
+          <a:schemeClr val="tx1"/>
+        </a:fontRef>
+      </a:style>
+    </a:lnDef>
+  </a:objectDefaults>
+  <a:extraClrSchemeLst/>
+  <a:extLst>
+    <a:ext uri="{05A4C25C-085E-4340-85A3-A5531E510DB2}">
+      <thm15:themeFamily xmlns:thm15="http://schemas.microsoft.com/office/thememl/2012/main" name="Office Theme" id="{2E142A2C-CD16-42D6-873A-C26D2A0506FA}" vid="{1BDDFF52-6CD6-40A5-AB3C-68EB2F1E4D0A}"/>
+    </a:ext>
+  </a:extLst>
+</a:theme>
 </file>
</xml_diff>